<commit_message>
Įkelta dar truputis skaidrių.
</commit_message>
<xml_diff>
--- a/Pristatymas.pptx
+++ b/Pristatymas.pptx
@@ -8,15 +8,16 @@
     <p:sldId id="256" r:id="rId2"/>
     <p:sldId id="257" r:id="rId3"/>
     <p:sldId id="261" r:id="rId4"/>
-    <p:sldId id="259" r:id="rId5"/>
-    <p:sldId id="267" r:id="rId6"/>
-    <p:sldId id="268" r:id="rId7"/>
-    <p:sldId id="269" r:id="rId8"/>
-    <p:sldId id="270" r:id="rId9"/>
-    <p:sldId id="271" r:id="rId10"/>
-    <p:sldId id="272" r:id="rId11"/>
-    <p:sldId id="273" r:id="rId12"/>
-    <p:sldId id="266" r:id="rId13"/>
+    <p:sldId id="274" r:id="rId5"/>
+    <p:sldId id="259" r:id="rId6"/>
+    <p:sldId id="267" r:id="rId7"/>
+    <p:sldId id="268" r:id="rId8"/>
+    <p:sldId id="269" r:id="rId9"/>
+    <p:sldId id="270" r:id="rId10"/>
+    <p:sldId id="271" r:id="rId11"/>
+    <p:sldId id="272" r:id="rId12"/>
+    <p:sldId id="273" r:id="rId13"/>
+    <p:sldId id="266" r:id="rId14"/>
   </p:sldIdLst>
   <p:sldSz cx="12192000" cy="6858000"/>
   <p:notesSz cx="6858000" cy="9144000"/>
@@ -5946,6 +5947,92 @@
           <p:cNvPr id="2" name="Title 1">
             <a:extLst>
               <a:ext uri="{FF2B5EF4-FFF2-40B4-BE49-F238E27FC236}">
+                <a16:creationId xmlns:a16="http://schemas.microsoft.com/office/drawing/2014/main" id="{0FFC1693-6E08-4A85-B6BA-6498FF77F477}"/>
+              </a:ext>
+            </a:extLst>
+          </p:cNvPr>
+          <p:cNvSpPr>
+            <a:spLocks noGrp="1"/>
+          </p:cNvSpPr>
+          <p:nvPr>
+            <p:ph type="title"/>
+          </p:nvPr>
+        </p:nvSpPr>
+        <p:spPr/>
+        <p:txBody>
+          <a:bodyPr/>
+          <a:lstStyle/>
+          <a:p>
+            <a:r>
+              <a:rPr lang="lt-LT" dirty="0"/>
+              <a:t>Darbingo amžiaus populiacija procentais</a:t>
+            </a:r>
+          </a:p>
+        </p:txBody>
+      </p:sp>
+      <p:pic>
+        <p:nvPicPr>
+          <p:cNvPr id="4" name="Picture 3">
+            <a:extLst>
+              <a:ext uri="{FF2B5EF4-FFF2-40B4-BE49-F238E27FC236}">
+                <a16:creationId xmlns:a16="http://schemas.microsoft.com/office/drawing/2014/main" id="{BC877EB6-FD26-43F2-9639-54CE3872AE8E}"/>
+              </a:ext>
+            </a:extLst>
+          </p:cNvPr>
+          <p:cNvPicPr/>
+          <p:nvPr/>
+        </p:nvPicPr>
+        <p:blipFill>
+          <a:blip r:embed="rId2"/>
+          <a:stretch>
+            <a:fillRect/>
+          </a:stretch>
+        </p:blipFill>
+        <p:spPr>
+          <a:xfrm>
+            <a:off x="1054685" y="1270000"/>
+            <a:ext cx="10082630" cy="5305887"/>
+          </a:xfrm>
+          <a:prstGeom prst="rect">
+            <a:avLst/>
+          </a:prstGeom>
+        </p:spPr>
+      </p:pic>
+    </p:spTree>
+    <p:extLst>
+      <p:ext uri="{BB962C8B-B14F-4D97-AF65-F5344CB8AC3E}">
+        <p14:creationId xmlns:p14="http://schemas.microsoft.com/office/powerpoint/2010/main" val="3565324823"/>
+      </p:ext>
+    </p:extLst>
+  </p:cSld>
+  <p:clrMapOvr>
+    <a:masterClrMapping/>
+  </p:clrMapOvr>
+</p:sld>
+</file>
+
+<file path=ppt/slides/slide11.xml><?xml version="1.0" encoding="utf-8"?>
+<p:sld xmlns:a="http://schemas.openxmlformats.org/drawingml/2006/main" xmlns:r="http://schemas.openxmlformats.org/officeDocument/2006/relationships" xmlns:p="http://schemas.openxmlformats.org/presentationml/2006/main">
+  <p:cSld>
+    <p:spTree>
+      <p:nvGrpSpPr>
+        <p:cNvPr id="1" name=""/>
+        <p:cNvGrpSpPr/>
+        <p:nvPr/>
+      </p:nvGrpSpPr>
+      <p:grpSpPr>
+        <a:xfrm>
+          <a:off x="0" y="0"/>
+          <a:ext cx="0" cy="0"/>
+          <a:chOff x="0" y="0"/>
+          <a:chExt cx="0" cy="0"/>
+        </a:xfrm>
+      </p:grpSpPr>
+      <p:sp>
+        <p:nvSpPr>
+          <p:cNvPr id="2" name="Title 1">
+            <a:extLst>
+              <a:ext uri="{FF2B5EF4-FFF2-40B4-BE49-F238E27FC236}">
                 <a16:creationId xmlns:a16="http://schemas.microsoft.com/office/drawing/2014/main" id="{9308E6FC-FFF1-4AF6-8391-C13AA43D8EED}"/>
               </a:ext>
             </a:extLst>
@@ -6010,7 +6097,7 @@
 </p:sld>
 </file>
 
-<file path=ppt/slides/slide11.xml><?xml version="1.0" encoding="utf-8"?>
+<file path=ppt/slides/slide12.xml><?xml version="1.0" encoding="utf-8"?>
 <p:sld xmlns:a="http://schemas.openxmlformats.org/drawingml/2006/main" xmlns:r="http://schemas.openxmlformats.org/officeDocument/2006/relationships" xmlns:p="http://schemas.openxmlformats.org/presentationml/2006/main">
   <p:cSld>
     <p:spTree>
@@ -6096,7 +6183,7 @@
 </p:sld>
 </file>
 
-<file path=ppt/slides/slide12.xml><?xml version="1.0" encoding="utf-8"?>
+<file path=ppt/slides/slide13.xml><?xml version="1.0" encoding="utf-8"?>
 <p:sld xmlns:a="http://schemas.openxmlformats.org/drawingml/2006/main" xmlns:r="http://schemas.openxmlformats.org/officeDocument/2006/relationships" xmlns:p="http://schemas.openxmlformats.org/presentationml/2006/main">
   <p:cSld>
     <p:spTree>
@@ -6541,6 +6628,161 @@
           <p:cNvPr id="2" name="Title 1">
             <a:extLst>
               <a:ext uri="{FF2B5EF4-FFF2-40B4-BE49-F238E27FC236}">
+                <a16:creationId xmlns:a16="http://schemas.microsoft.com/office/drawing/2014/main" id="{ACA2D880-0031-491A-9FE6-9FBD34C9E895}"/>
+              </a:ext>
+            </a:extLst>
+          </p:cNvPr>
+          <p:cNvSpPr>
+            <a:spLocks noGrp="1"/>
+          </p:cNvSpPr>
+          <p:nvPr>
+            <p:ph type="title"/>
+          </p:nvPr>
+        </p:nvSpPr>
+        <p:spPr/>
+        <p:txBody>
+          <a:bodyPr/>
+          <a:lstStyle/>
+          <a:p>
+            <a:r>
+              <a:rPr lang="lt-LT" dirty="0"/>
+              <a:t>Trumpai apie šalį</a:t>
+            </a:r>
+          </a:p>
+        </p:txBody>
+      </p:sp>
+      <p:sp>
+        <p:nvSpPr>
+          <p:cNvPr id="3" name="Content Placeholder 2">
+            <a:extLst>
+              <a:ext uri="{FF2B5EF4-FFF2-40B4-BE49-F238E27FC236}">
+                <a16:creationId xmlns:a16="http://schemas.microsoft.com/office/drawing/2014/main" id="{70926680-46E5-4071-A702-D2600E5B6567}"/>
+              </a:ext>
+            </a:extLst>
+          </p:cNvPr>
+          <p:cNvSpPr>
+            <a:spLocks noGrp="1"/>
+          </p:cNvSpPr>
+          <p:nvPr>
+            <p:ph sz="half" idx="1"/>
+          </p:nvPr>
+        </p:nvSpPr>
+        <p:spPr>
+          <a:xfrm>
+            <a:off x="677334" y="2160589"/>
+            <a:ext cx="6461403" cy="3880772"/>
+          </a:xfrm>
+        </p:spPr>
+        <p:txBody>
+          <a:bodyPr>
+            <a:normAutofit/>
+          </a:bodyPr>
+          <a:lstStyle/>
+          <a:p>
+            <a:r>
+              <a:rPr lang="lt-LT" sz="2400" dirty="0"/>
+              <a:t>Valstybė Pietų Amerikos šiaurės vakaruose.</a:t>
+            </a:r>
+          </a:p>
+          <a:p>
+            <a:r>
+              <a:rPr lang="lt-LT" sz="2400" dirty="0"/>
+              <a:t>Plotas - 1 138 910 km</a:t>
+            </a:r>
+            <a:r>
+              <a:rPr lang="lt-LT" sz="2400" baseline="30000" dirty="0"/>
+              <a:t>2 </a:t>
+            </a:r>
+            <a:r>
+              <a:rPr lang="lt-LT" sz="2400" dirty="0"/>
+              <a:t>(25 pasaulio šalis)</a:t>
+            </a:r>
+          </a:p>
+          <a:p>
+            <a:r>
+              <a:rPr lang="lt-LT" sz="2400" dirty="0"/>
+              <a:t>49 milijonai gyventojų (28 pasaulio šalis)</a:t>
+            </a:r>
+          </a:p>
+          <a:p>
+            <a:r>
+              <a:rPr lang="lt-LT" sz="2400" dirty="0"/>
+              <a:t>Valstybinė kalba – ispanų</a:t>
+            </a:r>
+          </a:p>
+          <a:p>
+            <a:r>
+              <a:rPr lang="lt-LT" sz="2400" dirty="0"/>
+              <a:t>Sostinė - Bogota</a:t>
+            </a:r>
+          </a:p>
+        </p:txBody>
+      </p:sp>
+      <p:pic>
+        <p:nvPicPr>
+          <p:cNvPr id="5" name="Picture 4">
+            <a:extLst>
+              <a:ext uri="{FF2B5EF4-FFF2-40B4-BE49-F238E27FC236}">
+                <a16:creationId xmlns:a16="http://schemas.microsoft.com/office/drawing/2014/main" id="{2CE3D491-F243-4BE6-AC5A-9801DCE04DAC}"/>
+              </a:ext>
+            </a:extLst>
+          </p:cNvPr>
+          <p:cNvPicPr>
+            <a:picLocks noChangeAspect="1"/>
+          </p:cNvPicPr>
+          <p:nvPr/>
+        </p:nvPicPr>
+        <p:blipFill>
+          <a:blip r:embed="rId2"/>
+          <a:stretch>
+            <a:fillRect/>
+          </a:stretch>
+        </p:blipFill>
+        <p:spPr>
+          <a:xfrm>
+            <a:off x="7232180" y="1270000"/>
+            <a:ext cx="4282486" cy="4298030"/>
+          </a:xfrm>
+          <a:prstGeom prst="rect">
+            <a:avLst/>
+          </a:prstGeom>
+        </p:spPr>
+      </p:pic>
+    </p:spTree>
+    <p:extLst>
+      <p:ext uri="{BB962C8B-B14F-4D97-AF65-F5344CB8AC3E}">
+        <p14:creationId xmlns:p14="http://schemas.microsoft.com/office/powerpoint/2010/main" val="3810451509"/>
+      </p:ext>
+    </p:extLst>
+  </p:cSld>
+  <p:clrMapOvr>
+    <a:masterClrMapping/>
+  </p:clrMapOvr>
+</p:sld>
+</file>
+
+<file path=ppt/slides/slide5.xml><?xml version="1.0" encoding="utf-8"?>
+<p:sld xmlns:a="http://schemas.openxmlformats.org/drawingml/2006/main" xmlns:r="http://schemas.openxmlformats.org/officeDocument/2006/relationships" xmlns:p="http://schemas.openxmlformats.org/presentationml/2006/main">
+  <p:cSld>
+    <p:spTree>
+      <p:nvGrpSpPr>
+        <p:cNvPr id="1" name=""/>
+        <p:cNvGrpSpPr/>
+        <p:nvPr/>
+      </p:nvGrpSpPr>
+      <p:grpSpPr>
+        <a:xfrm>
+          <a:off x="0" y="0"/>
+          <a:ext cx="0" cy="0"/>
+          <a:chOff x="0" y="0"/>
+          <a:chExt cx="0" cy="0"/>
+        </a:xfrm>
+      </p:grpSpPr>
+      <p:sp>
+        <p:nvSpPr>
+          <p:cNvPr id="2" name="Title 1">
+            <a:extLst>
+              <a:ext uri="{FF2B5EF4-FFF2-40B4-BE49-F238E27FC236}">
                 <a16:creationId xmlns:a16="http://schemas.microsoft.com/office/drawing/2014/main" id="{F5A613DF-EEF4-4884-B9D2-7FEFCE5A57DA}"/>
               </a:ext>
             </a:extLst>
@@ -6651,7 +6893,7 @@
 </p:sld>
 </file>
 
-<file path=ppt/slides/slide5.xml><?xml version="1.0" encoding="utf-8"?>
+<file path=ppt/slides/slide6.xml><?xml version="1.0" encoding="utf-8"?>
 <p:sld xmlns:a="http://schemas.openxmlformats.org/drawingml/2006/main" xmlns:r="http://schemas.openxmlformats.org/officeDocument/2006/relationships" xmlns:p="http://schemas.openxmlformats.org/presentationml/2006/main">
   <p:cSld>
     <p:spTree>
@@ -6737,7 +6979,7 @@
 </p:sld>
 </file>
 
-<file path=ppt/slides/slide6.xml><?xml version="1.0" encoding="utf-8"?>
+<file path=ppt/slides/slide7.xml><?xml version="1.0" encoding="utf-8"?>
 <p:sld xmlns:a="http://schemas.openxmlformats.org/drawingml/2006/main" xmlns:r="http://schemas.openxmlformats.org/officeDocument/2006/relationships" xmlns:p="http://schemas.openxmlformats.org/presentationml/2006/main">
   <p:cSld>
     <p:spTree>
@@ -6826,7 +7068,7 @@
 </p:sld>
 </file>
 
-<file path=ppt/slides/slide7.xml><?xml version="1.0" encoding="utf-8"?>
+<file path=ppt/slides/slide8.xml><?xml version="1.0" encoding="utf-8"?>
 <p:sld xmlns:a="http://schemas.openxmlformats.org/drawingml/2006/main" xmlns:r="http://schemas.openxmlformats.org/officeDocument/2006/relationships" xmlns:p="http://schemas.openxmlformats.org/presentationml/2006/main">
   <p:cSld>
     <p:spTree>
@@ -6912,7 +7154,7 @@
 </p:sld>
 </file>
 
-<file path=ppt/slides/slide8.xml><?xml version="1.0" encoding="utf-8"?>
+<file path=ppt/slides/slide9.xml><?xml version="1.0" encoding="utf-8"?>
 <p:sld xmlns:a="http://schemas.openxmlformats.org/drawingml/2006/main" xmlns:r="http://schemas.openxmlformats.org/officeDocument/2006/relationships" xmlns:p="http://schemas.openxmlformats.org/presentationml/2006/main">
   <p:cSld>
     <p:spTree>
@@ -6989,92 +7231,6 @@
     <p:extLst>
       <p:ext uri="{BB962C8B-B14F-4D97-AF65-F5344CB8AC3E}">
         <p14:creationId xmlns:p14="http://schemas.microsoft.com/office/powerpoint/2010/main" val="2055471898"/>
-      </p:ext>
-    </p:extLst>
-  </p:cSld>
-  <p:clrMapOvr>
-    <a:masterClrMapping/>
-  </p:clrMapOvr>
-</p:sld>
-</file>
-
-<file path=ppt/slides/slide9.xml><?xml version="1.0" encoding="utf-8"?>
-<p:sld xmlns:a="http://schemas.openxmlformats.org/drawingml/2006/main" xmlns:r="http://schemas.openxmlformats.org/officeDocument/2006/relationships" xmlns:p="http://schemas.openxmlformats.org/presentationml/2006/main">
-  <p:cSld>
-    <p:spTree>
-      <p:nvGrpSpPr>
-        <p:cNvPr id="1" name=""/>
-        <p:cNvGrpSpPr/>
-        <p:nvPr/>
-      </p:nvGrpSpPr>
-      <p:grpSpPr>
-        <a:xfrm>
-          <a:off x="0" y="0"/>
-          <a:ext cx="0" cy="0"/>
-          <a:chOff x="0" y="0"/>
-          <a:chExt cx="0" cy="0"/>
-        </a:xfrm>
-      </p:grpSpPr>
-      <p:sp>
-        <p:nvSpPr>
-          <p:cNvPr id="2" name="Title 1">
-            <a:extLst>
-              <a:ext uri="{FF2B5EF4-FFF2-40B4-BE49-F238E27FC236}">
-                <a16:creationId xmlns:a16="http://schemas.microsoft.com/office/drawing/2014/main" id="{0FFC1693-6E08-4A85-B6BA-6498FF77F477}"/>
-              </a:ext>
-            </a:extLst>
-          </p:cNvPr>
-          <p:cNvSpPr>
-            <a:spLocks noGrp="1"/>
-          </p:cNvSpPr>
-          <p:nvPr>
-            <p:ph type="title"/>
-          </p:nvPr>
-        </p:nvSpPr>
-        <p:spPr/>
-        <p:txBody>
-          <a:bodyPr/>
-          <a:lstStyle/>
-          <a:p>
-            <a:r>
-              <a:rPr lang="lt-LT" dirty="0"/>
-              <a:t>Darbingo amžiaus populiacija procentais</a:t>
-            </a:r>
-          </a:p>
-        </p:txBody>
-      </p:sp>
-      <p:pic>
-        <p:nvPicPr>
-          <p:cNvPr id="4" name="Picture 3">
-            <a:extLst>
-              <a:ext uri="{FF2B5EF4-FFF2-40B4-BE49-F238E27FC236}">
-                <a16:creationId xmlns:a16="http://schemas.microsoft.com/office/drawing/2014/main" id="{BC877EB6-FD26-43F2-9639-54CE3872AE8E}"/>
-              </a:ext>
-            </a:extLst>
-          </p:cNvPr>
-          <p:cNvPicPr/>
-          <p:nvPr/>
-        </p:nvPicPr>
-        <p:blipFill>
-          <a:blip r:embed="rId2"/>
-          <a:stretch>
-            <a:fillRect/>
-          </a:stretch>
-        </p:blipFill>
-        <p:spPr>
-          <a:xfrm>
-            <a:off x="1054685" y="1270000"/>
-            <a:ext cx="10082630" cy="5305887"/>
-          </a:xfrm>
-          <a:prstGeom prst="rect">
-            <a:avLst/>
-          </a:prstGeom>
-        </p:spPr>
-      </p:pic>
-    </p:spTree>
-    <p:extLst>
-      <p:ext uri="{BB962C8B-B14F-4D97-AF65-F5344CB8AC3E}">
-        <p14:creationId xmlns:p14="http://schemas.microsoft.com/office/powerpoint/2010/main" val="3565324823"/>
       </p:ext>
     </p:extLst>
   </p:cSld>

</xml_diff>

<commit_message>
Galutine mano versija, i guess.
</commit_message>
<xml_diff>
--- a/Pristatymas.pptx
+++ b/Pristatymas.pptx
@@ -8406,8 +8406,29 @@
             </a:pPr>
             <a:r>
               <a:rPr lang="lt-LT" sz="2400" dirty="0"/>
-              <a:t>Išvados</a:t>
-            </a:r>
+              <a:t>Lyginant su didžiosiomis Pietų Amerikos šalimis, Kolumbijos ekonominė padėtis yra viena prasčiausių.</a:t>
+            </a:r>
+          </a:p>
+          <a:p>
+            <a:pPr marL="285750" indent="-285750">
+              <a:buFont typeface="Arial" panose="020B0604020202020204" pitchFamily="34" charset="0"/>
+              <a:buChar char="•"/>
+            </a:pPr>
+            <a:r>
+              <a:rPr lang="lt-LT" sz="2400" dirty="0"/>
+              <a:t>Populiacija didėja ir sensta, daugėja darbingo amžiaus žmonių.</a:t>
+            </a:r>
+          </a:p>
+          <a:p>
+            <a:pPr marL="285750" indent="-285750">
+              <a:buFont typeface="Arial" panose="020B0604020202020204" pitchFamily="34" charset="0"/>
+              <a:buChar char="•"/>
+            </a:pPr>
+            <a:r>
+              <a:rPr lang="lt-LT" sz="2400"/>
+              <a:t>Švietimo rodikliai nežymiai prastesni nei aukšto išsivystymo šalių ir Lotynų Amerikos ir Karibų regiono.</a:t>
+            </a:r>
+            <a:endParaRPr lang="lt-LT" sz="2400" dirty="0"/>
           </a:p>
           <a:p>
             <a:pPr marL="285750" indent="-285750">

</xml_diff>

<commit_message>
raida_final pervadintas i Pristatymas tiesiog.
</commit_message>
<xml_diff>
--- a/Pristatymas.pptx
+++ b/Pristatymas.pptx
@@ -20,8 +20,16 @@
     <p:sldId id="272" r:id="rId14"/>
     <p:sldId id="273" r:id="rId15"/>
     <p:sldId id="275" r:id="rId16"/>
-    <p:sldId id="276" r:id="rId17"/>
-    <p:sldId id="266" r:id="rId18"/>
+    <p:sldId id="279" r:id="rId17"/>
+    <p:sldId id="280" r:id="rId18"/>
+    <p:sldId id="281" r:id="rId19"/>
+    <p:sldId id="282" r:id="rId20"/>
+    <p:sldId id="283" r:id="rId21"/>
+    <p:sldId id="284" r:id="rId22"/>
+    <p:sldId id="285" r:id="rId23"/>
+    <p:sldId id="286" r:id="rId24"/>
+    <p:sldId id="266" r:id="rId25"/>
+    <p:sldId id="287" r:id="rId26"/>
   </p:sldIdLst>
   <p:sldSz cx="12192000" cy="6858000"/>
   <p:notesSz cx="6858000" cy="9144000"/>
@@ -854,7 +862,7 @@
           <a:p>
             <a:fld id="{4858E1F8-2BB6-45DC-A6F5-03CFDFDDE760}" type="datetimeFigureOut">
               <a:rPr lang="lt-LT" smtClean="0"/>
-              <a:t>2017-11-29</a:t>
+              <a:t>2017-11-30</a:t>
             </a:fld>
             <a:endParaRPr lang="lt-LT"/>
           </a:p>
@@ -1105,7 +1113,7 @@
           <a:p>
             <a:fld id="{4858E1F8-2BB6-45DC-A6F5-03CFDFDDE760}" type="datetimeFigureOut">
               <a:rPr lang="lt-LT" smtClean="0"/>
-              <a:t>2017-11-29</a:t>
+              <a:t>2017-11-30</a:t>
             </a:fld>
             <a:endParaRPr lang="lt-LT"/>
           </a:p>
@@ -1419,7 +1427,7 @@
           <a:p>
             <a:fld id="{4858E1F8-2BB6-45DC-A6F5-03CFDFDDE760}" type="datetimeFigureOut">
               <a:rPr lang="lt-LT" smtClean="0"/>
-              <a:t>2017-11-29</a:t>
+              <a:t>2017-11-30</a:t>
             </a:fld>
             <a:endParaRPr lang="lt-LT"/>
           </a:p>
@@ -1760,7 +1768,7 @@
           <a:p>
             <a:fld id="{4858E1F8-2BB6-45DC-A6F5-03CFDFDDE760}" type="datetimeFigureOut">
               <a:rPr lang="lt-LT" smtClean="0"/>
-              <a:t>2017-11-29</a:t>
+              <a:t>2017-11-30</a:t>
             </a:fld>
             <a:endParaRPr lang="lt-LT"/>
           </a:p>
@@ -2074,7 +2082,7 @@
           <a:p>
             <a:fld id="{4858E1F8-2BB6-45DC-A6F5-03CFDFDDE760}" type="datetimeFigureOut">
               <a:rPr lang="lt-LT" smtClean="0"/>
-              <a:t>2017-11-29</a:t>
+              <a:t>2017-11-30</a:t>
             </a:fld>
             <a:endParaRPr lang="lt-LT"/>
           </a:p>
@@ -2467,7 +2475,7 @@
           <a:p>
             <a:fld id="{4858E1F8-2BB6-45DC-A6F5-03CFDFDDE760}" type="datetimeFigureOut">
               <a:rPr lang="lt-LT" smtClean="0"/>
-              <a:t>2017-11-29</a:t>
+              <a:t>2017-11-30</a:t>
             </a:fld>
             <a:endParaRPr lang="lt-LT"/>
           </a:p>
@@ -2637,7 +2645,7 @@
           <a:p>
             <a:fld id="{4858E1F8-2BB6-45DC-A6F5-03CFDFDDE760}" type="datetimeFigureOut">
               <a:rPr lang="lt-LT" smtClean="0"/>
-              <a:t>2017-11-29</a:t>
+              <a:t>2017-11-30</a:t>
             </a:fld>
             <a:endParaRPr lang="lt-LT"/>
           </a:p>
@@ -2817,7 +2825,7 @@
           <a:p>
             <a:fld id="{4858E1F8-2BB6-45DC-A6F5-03CFDFDDE760}" type="datetimeFigureOut">
               <a:rPr lang="lt-LT" smtClean="0"/>
-              <a:t>2017-11-29</a:t>
+              <a:t>2017-11-30</a:t>
             </a:fld>
             <a:endParaRPr lang="lt-LT"/>
           </a:p>
@@ -2993,7 +3001,7 @@
           <a:p>
             <a:fld id="{4858E1F8-2BB6-45DC-A6F5-03CFDFDDE760}" type="datetimeFigureOut">
               <a:rPr lang="lt-LT" smtClean="0"/>
-              <a:t>2017-11-29</a:t>
+              <a:t>2017-11-30</a:t>
             </a:fld>
             <a:endParaRPr lang="lt-LT"/>
           </a:p>
@@ -3240,7 +3248,7 @@
           <a:p>
             <a:fld id="{4858E1F8-2BB6-45DC-A6F5-03CFDFDDE760}" type="datetimeFigureOut">
               <a:rPr lang="lt-LT" smtClean="0"/>
-              <a:t>2017-11-29</a:t>
+              <a:t>2017-11-30</a:t>
             </a:fld>
             <a:endParaRPr lang="lt-LT"/>
           </a:p>
@@ -3472,7 +3480,7 @@
           <a:p>
             <a:fld id="{4858E1F8-2BB6-45DC-A6F5-03CFDFDDE760}" type="datetimeFigureOut">
               <a:rPr lang="lt-LT" smtClean="0"/>
-              <a:t>2017-11-29</a:t>
+              <a:t>2017-11-30</a:t>
             </a:fld>
             <a:endParaRPr lang="lt-LT"/>
           </a:p>
@@ -3846,7 +3854,7 @@
           <a:p>
             <a:fld id="{4858E1F8-2BB6-45DC-A6F5-03CFDFDDE760}" type="datetimeFigureOut">
               <a:rPr lang="lt-LT" smtClean="0"/>
-              <a:t>2017-11-29</a:t>
+              <a:t>2017-11-30</a:t>
             </a:fld>
             <a:endParaRPr lang="lt-LT"/>
           </a:p>
@@ -3969,7 +3977,7 @@
           <a:p>
             <a:fld id="{4858E1F8-2BB6-45DC-A6F5-03CFDFDDE760}" type="datetimeFigureOut">
               <a:rPr lang="lt-LT" smtClean="0"/>
-              <a:t>2017-11-29</a:t>
+              <a:t>2017-11-30</a:t>
             </a:fld>
             <a:endParaRPr lang="lt-LT"/>
           </a:p>
@@ -4064,7 +4072,7 @@
           <a:p>
             <a:fld id="{4858E1F8-2BB6-45DC-A6F5-03CFDFDDE760}" type="datetimeFigureOut">
               <a:rPr lang="lt-LT" smtClean="0"/>
-              <a:t>2017-11-29</a:t>
+              <a:t>2017-11-30</a:t>
             </a:fld>
             <a:endParaRPr lang="lt-LT"/>
           </a:p>
@@ -4319,7 +4327,7 @@
           <a:p>
             <a:fld id="{4858E1F8-2BB6-45DC-A6F5-03CFDFDDE760}" type="datetimeFigureOut">
               <a:rPr lang="lt-LT" smtClean="0"/>
-              <a:t>2017-11-29</a:t>
+              <a:t>2017-11-30</a:t>
             </a:fld>
             <a:endParaRPr lang="lt-LT"/>
           </a:p>
@@ -4582,7 +4590,7 @@
           <a:p>
             <a:fld id="{4858E1F8-2BB6-45DC-A6F5-03CFDFDDE760}" type="datetimeFigureOut">
               <a:rPr lang="lt-LT" smtClean="0"/>
-              <a:t>2017-11-29</a:t>
+              <a:t>2017-11-30</a:t>
             </a:fld>
             <a:endParaRPr lang="lt-LT"/>
           </a:p>
@@ -5325,7 +5333,7 @@
           <a:p>
             <a:fld id="{4858E1F8-2BB6-45DC-A6F5-03CFDFDDE760}" type="datetimeFigureOut">
               <a:rPr lang="lt-LT" smtClean="0"/>
-              <a:t>2017-11-29</a:t>
+              <a:t>2017-11-30</a:t>
             </a:fld>
             <a:endParaRPr lang="lt-LT"/>
           </a:p>
@@ -5865,7 +5873,12 @@
             <p:ph type="ctrTitle"/>
           </p:nvPr>
         </p:nvSpPr>
-        <p:spPr/>
+        <p:spPr>
+          <a:xfrm>
+            <a:off x="1507067" y="2404534"/>
+            <a:ext cx="7766936" cy="1646302"/>
+          </a:xfrm>
+        </p:spPr>
         <p:txBody>
           <a:bodyPr/>
           <a:lstStyle/>
@@ -5893,7 +5906,12 @@
             <p:ph type="subTitle" idx="1"/>
           </p:nvPr>
         </p:nvSpPr>
-        <p:spPr/>
+        <p:spPr>
+          <a:xfrm>
+            <a:off x="1507067" y="4050833"/>
+            <a:ext cx="7766936" cy="1096899"/>
+          </a:xfrm>
+        </p:spPr>
         <p:txBody>
           <a:bodyPr/>
           <a:lstStyle/>
@@ -5906,13 +5924,8 @@
           <a:p>
             <a:r>
               <a:rPr lang="lt-LT" dirty="0"/>
-              <a:t>		        Šarūnas </a:t>
-            </a:r>
-            <a:r>
-              <a:rPr lang="lt-LT" dirty="0" err="1"/>
-              <a:t>Pukys</a:t>
-            </a:r>
-            <a:endParaRPr lang="lt-LT" dirty="0"/>
+              <a:t>		        Šarūnas Pukys IFZm-5</a:t>
+            </a:r>
           </a:p>
         </p:txBody>
       </p:sp>
@@ -6392,7 +6405,12 @@
             <p:ph type="title"/>
           </p:nvPr>
         </p:nvSpPr>
-        <p:spPr/>
+        <p:spPr>
+          <a:xfrm>
+            <a:off x="627000" y="131428"/>
+            <a:ext cx="8596668" cy="1320800"/>
+          </a:xfrm>
+        </p:spPr>
         <p:txBody>
           <a:bodyPr/>
           <a:lstStyle/>
@@ -6404,67 +6422,12 @@
           </a:p>
         </p:txBody>
       </p:sp>
-      <p:sp>
-        <p:nvSpPr>
-          <p:cNvPr id="3" name="Content Placeholder 2">
-            <a:extLst>
-              <a:ext uri="{FF2B5EF4-FFF2-40B4-BE49-F238E27FC236}">
-                <a16:creationId xmlns:a16="http://schemas.microsoft.com/office/drawing/2014/main" id="{12F8EF1C-B1B1-45ED-8AD0-6B783171E737}"/>
-              </a:ext>
-            </a:extLst>
-          </p:cNvPr>
-          <p:cNvSpPr>
-            <a:spLocks noGrp="1"/>
-          </p:cNvSpPr>
-          <p:nvPr>
-            <p:ph idx="1"/>
-          </p:nvPr>
-        </p:nvSpPr>
-        <p:spPr/>
-        <p:txBody>
-          <a:bodyPr/>
-          <a:lstStyle/>
-          <a:p>
-            <a:endParaRPr lang="lt-LT"/>
-          </a:p>
-        </p:txBody>
-      </p:sp>
-    </p:spTree>
-    <p:extLst>
-      <p:ext uri="{BB962C8B-B14F-4D97-AF65-F5344CB8AC3E}">
-        <p14:creationId xmlns:p14="http://schemas.microsoft.com/office/powerpoint/2010/main" val="4026163098"/>
-      </p:ext>
-    </p:extLst>
-  </p:cSld>
-  <p:clrMapOvr>
-    <a:masterClrMapping/>
-  </p:clrMapOvr>
-</p:sld>
-</file>
-
-<file path=ppt/slides/slide16.xml><?xml version="1.0" encoding="utf-8"?>
-<p:sld xmlns:a="http://schemas.openxmlformats.org/drawingml/2006/main" xmlns:r="http://schemas.openxmlformats.org/officeDocument/2006/relationships" xmlns:p="http://schemas.openxmlformats.org/presentationml/2006/main">
-  <p:cSld>
-    <p:spTree>
-      <p:nvGrpSpPr>
-        <p:cNvPr id="1" name=""/>
-        <p:cNvGrpSpPr/>
-        <p:nvPr/>
-      </p:nvGrpSpPr>
-      <p:grpSpPr>
-        <a:xfrm>
-          <a:off x="0" y="0"/>
-          <a:ext cx="0" cy="0"/>
-          <a:chOff x="0" y="0"/>
-          <a:chExt cx="0" cy="0"/>
-        </a:xfrm>
-      </p:grpSpPr>
       <p:graphicFrame>
         <p:nvGraphicFramePr>
           <p:cNvPr id="4" name="Table 3">
             <a:extLst>
               <a:ext uri="{FF2B5EF4-FFF2-40B4-BE49-F238E27FC236}">
-                <a16:creationId xmlns:a16="http://schemas.microsoft.com/office/drawing/2014/main" id="{7B55B4E6-BF4D-487A-BA93-9CECBB09D7A3}"/>
+                <a16:creationId xmlns:a16="http://schemas.microsoft.com/office/drawing/2014/main" id="{7F47ADBC-CCA5-412F-BF29-89602851A286}"/>
               </a:ext>
             </a:extLst>
           </p:cNvPr>
@@ -6474,14 +6437,14 @@
           <p:nvPr>
             <p:extLst>
               <p:ext uri="{D42A27DB-BD31-4B8C-83A1-F6EECF244321}">
-                <p14:modId xmlns:p14="http://schemas.microsoft.com/office/powerpoint/2010/main" val="4174229072"/>
+                <p14:modId xmlns:p14="http://schemas.microsoft.com/office/powerpoint/2010/main" val="701595314"/>
               </p:ext>
             </p:extLst>
           </p:nvPr>
         </p:nvGraphicFramePr>
         <p:xfrm>
-          <a:off x="483422" y="600826"/>
-          <a:ext cx="10900557" cy="5805290"/>
+          <a:off x="240140" y="704674"/>
+          <a:ext cx="11462506" cy="6083160"/>
         </p:xfrm>
         <a:graphic>
           <a:graphicData uri="http://schemas.openxmlformats.org/drawingml/2006/table">
@@ -6490,70 +6453,70 @@
                 <a:tableStyleId>{5C22544A-7EE6-4342-B048-85BDC9FD1C3A}</a:tableStyleId>
               </a:tblPr>
               <a:tblGrid>
-                <a:gridCol w="2124291">
+                <a:gridCol w="2219735">
                   <a:extLst>
                     <a:ext uri="{9D8B030D-6E8A-4147-A177-3AD203B41FA5}">
                       <a16:colId xmlns:a16="http://schemas.microsoft.com/office/drawing/2014/main" val="1754050782"/>
                     </a:ext>
                   </a:extLst>
                 </a:gridCol>
-                <a:gridCol w="1273174">
+                <a:gridCol w="1330377">
                   <a:extLst>
                     <a:ext uri="{9D8B030D-6E8A-4147-A177-3AD203B41FA5}">
                       <a16:colId xmlns:a16="http://schemas.microsoft.com/office/drawing/2014/main" val="3691867523"/>
                     </a:ext>
                   </a:extLst>
                 </a:gridCol>
-                <a:gridCol w="1273174">
+                <a:gridCol w="1330377">
                   <a:extLst>
                     <a:ext uri="{9D8B030D-6E8A-4147-A177-3AD203B41FA5}">
                       <a16:colId xmlns:a16="http://schemas.microsoft.com/office/drawing/2014/main" val="3348591308"/>
                     </a:ext>
                   </a:extLst>
                 </a:gridCol>
-                <a:gridCol w="954131">
+                <a:gridCol w="997000">
                   <a:extLst>
                     <a:ext uri="{9D8B030D-6E8A-4147-A177-3AD203B41FA5}">
                       <a16:colId xmlns:a16="http://schemas.microsoft.com/office/drawing/2014/main" val="663500623"/>
                     </a:ext>
                   </a:extLst>
                 </a:gridCol>
-                <a:gridCol w="1139155">
+                <a:gridCol w="1190337">
                   <a:extLst>
                     <a:ext uri="{9D8B030D-6E8A-4147-A177-3AD203B41FA5}">
                       <a16:colId xmlns:a16="http://schemas.microsoft.com/office/drawing/2014/main" val="3508972722"/>
                     </a:ext>
                   </a:extLst>
                 </a:gridCol>
-                <a:gridCol w="177058">
+                <a:gridCol w="221108">
                   <a:extLst>
                     <a:ext uri="{9D8B030D-6E8A-4147-A177-3AD203B41FA5}">
                       <a16:colId xmlns:a16="http://schemas.microsoft.com/office/drawing/2014/main" val="3245299284"/>
                     </a:ext>
                   </a:extLst>
                 </a:gridCol>
-                <a:gridCol w="1376188">
+                <a:gridCol w="1438020">
                   <a:extLst>
                     <a:ext uri="{9D8B030D-6E8A-4147-A177-3AD203B41FA5}">
                       <a16:colId xmlns:a16="http://schemas.microsoft.com/office/drawing/2014/main" val="2599617444"/>
                     </a:ext>
                   </a:extLst>
                 </a:gridCol>
-                <a:gridCol w="1376188">
+                <a:gridCol w="1438020">
                   <a:extLst>
                     <a:ext uri="{9D8B030D-6E8A-4147-A177-3AD203B41FA5}">
                       <a16:colId xmlns:a16="http://schemas.microsoft.com/office/drawing/2014/main" val="1209339178"/>
                     </a:ext>
                   </a:extLst>
                 </a:gridCol>
-                <a:gridCol w="1030140">
+                <a:gridCol w="1076424">
                   <a:extLst>
                     <a:ext uri="{9D8B030D-6E8A-4147-A177-3AD203B41FA5}">
                       <a16:colId xmlns:a16="http://schemas.microsoft.com/office/drawing/2014/main" val="319544403"/>
                     </a:ext>
                   </a:extLst>
                 </a:gridCol>
-                <a:gridCol w="177058">
+                <a:gridCol w="221108">
                   <a:extLst>
                     <a:ext uri="{9D8B030D-6E8A-4147-A177-3AD203B41FA5}">
                       <a16:colId xmlns:a16="http://schemas.microsoft.com/office/drawing/2014/main" val="12273684"/>
@@ -6561,7 +6524,7 @@
                   </a:extLst>
                 </a:gridCol>
               </a:tblGrid>
-              <a:tr h="315954">
+              <a:tr h="396003">
                 <a:tc rowSpan="4">
                   <a:txBody>
                     <a:bodyPr/>
@@ -6605,12 +6568,12 @@
                         </a:spcAft>
                       </a:pPr>
                       <a:r>
-                        <a:rPr lang="lt-LT" sz="1800">
+                        <a:rPr lang="lt-LT" sz="1800" dirty="0">
                           <a:effectLst/>
                         </a:rPr>
                         <a:t>Raštingumas</a:t>
                       </a:r>
-                      <a:endParaRPr lang="lt-LT" sz="1800">
+                      <a:endParaRPr lang="lt-LT" sz="1800" dirty="0">
                         <a:effectLst/>
                         <a:latin typeface="Calibri" panose="020F0502020204030204" pitchFamily="34" charset="0"/>
                         <a:ea typeface="Calibri" panose="020F0502020204030204" pitchFamily="34" charset="0"/>
@@ -6725,7 +6688,7 @@
                   </a:ext>
                 </a:extLst>
               </a:tr>
-              <a:tr h="1579769">
+              <a:tr h="1701455">
                 <a:tc vMerge="1">
                   <a:txBody>
                     <a:bodyPr/>
@@ -6857,12 +6820,12 @@
                         </a:spcAft>
                       </a:pPr>
                       <a:r>
-                        <a:rPr lang="lt-LT" sz="1800">
+                        <a:rPr lang="lt-LT" sz="1800" dirty="0">
                           <a:effectLst/>
                         </a:rPr>
                         <a:t>Pradinės mokyklos mokytojai išmokyti mokyti</a:t>
                       </a:r>
-                      <a:endParaRPr lang="lt-LT" sz="1800">
+                      <a:endParaRPr lang="lt-LT" sz="1800" dirty="0">
                         <a:effectLst/>
                         <a:latin typeface="Calibri" panose="020F0502020204030204" pitchFamily="34" charset="0"/>
                         <a:ea typeface="Calibri" panose="020F0502020204030204" pitchFamily="34" charset="0"/>
@@ -6965,7 +6928,7 @@
                   </a:ext>
                 </a:extLst>
               </a:tr>
-              <a:tr h="947861">
+              <a:tr h="1044362">
                 <a:tc vMerge="1">
                   <a:txBody>
                     <a:bodyPr/>
@@ -7019,12 +6982,12 @@
                         </a:spcAft>
                       </a:pPr>
                       <a:r>
-                        <a:rPr lang="lt-LT" sz="1800">
+                        <a:rPr lang="lt-LT" sz="1800" dirty="0">
                           <a:effectLst/>
                         </a:rPr>
                         <a:t>Moterys</a:t>
                       </a:r>
-                      <a:endParaRPr lang="lt-LT" sz="1800">
+                      <a:endParaRPr lang="lt-LT" sz="1800" dirty="0">
                         <a:effectLst/>
                         <a:latin typeface="Calibri" panose="020F0502020204030204" pitchFamily="34" charset="0"/>
                         <a:ea typeface="Calibri" panose="020F0502020204030204" pitchFamily="34" charset="0"/>
@@ -7145,12 +7108,12 @@
                         </a:spcAft>
                       </a:pPr>
                       <a:r>
-                        <a:rPr lang="lt-LT" sz="1800">
+                        <a:rPr lang="lt-LT" sz="1800" dirty="0">
                           <a:effectLst/>
                         </a:rPr>
                         <a:t>(mokinių skaičius 1 mokytojui)</a:t>
                       </a:r>
-                      <a:endParaRPr lang="lt-LT" sz="1800">
+                      <a:endParaRPr lang="lt-LT" sz="1800" dirty="0">
                         <a:effectLst/>
                         <a:latin typeface="Calibri" panose="020F0502020204030204" pitchFamily="34" charset="0"/>
                         <a:ea typeface="Calibri" panose="020F0502020204030204" pitchFamily="34" charset="0"/>
@@ -7224,7 +7187,7 @@
                   </a:ext>
                 </a:extLst>
               </a:tr>
-              <a:tr h="877720">
+              <a:tr h="783271">
                 <a:tc vMerge="1">
                   <a:txBody>
                     <a:bodyPr/>
@@ -7278,12 +7241,12 @@
                         </a:spcAft>
                       </a:pPr>
                       <a:r>
-                        <a:rPr lang="lt-LT" sz="1800">
+                        <a:rPr lang="lt-LT" sz="1800" dirty="0">
                           <a:effectLst/>
                         </a:rPr>
                         <a:t>2005 - 2015 m.</a:t>
                       </a:r>
-                      <a:endParaRPr lang="lt-LT" sz="1800">
+                      <a:endParaRPr lang="lt-LT" sz="1800" dirty="0">
                         <a:effectLst/>
                         <a:latin typeface="Calibri" panose="020F0502020204030204" pitchFamily="34" charset="0"/>
                         <a:ea typeface="Calibri" panose="020F0502020204030204" pitchFamily="34" charset="0"/>
@@ -7404,12 +7367,12 @@
                         </a:spcAft>
                       </a:pPr>
                       <a:r>
-                        <a:rPr lang="lt-LT" sz="1800">
+                        <a:rPr lang="lt-LT" sz="1800" dirty="0">
                           <a:effectLst/>
                         </a:rPr>
                         <a:t>2010 - 2015 m.</a:t>
                       </a:r>
-                      <a:endParaRPr lang="lt-LT" sz="1800">
+                      <a:endParaRPr lang="lt-LT" sz="1800" dirty="0">
                         <a:effectLst/>
                         <a:latin typeface="Calibri" panose="020F0502020204030204" pitchFamily="34" charset="0"/>
                         <a:ea typeface="Calibri" panose="020F0502020204030204" pitchFamily="34" charset="0"/>
@@ -7483,7 +7446,7 @@
                   </a:ext>
                 </a:extLst>
               </a:tr>
-              <a:tr h="315954">
+              <a:tr h="396003">
                 <a:tc>
                   <a:txBody>
                     <a:bodyPr/>
@@ -7761,7 +7724,7 @@
                   </a:ext>
                 </a:extLst>
               </a:tr>
-              <a:tr h="580197">
+              <a:tr h="783271">
                 <a:tc>
                   <a:txBody>
                     <a:bodyPr/>
@@ -8039,7 +8002,7 @@
                   </a:ext>
                 </a:extLst>
               </a:tr>
-              <a:tr h="877720">
+              <a:tr h="783271">
                 <a:tc>
                   <a:txBody>
                     <a:bodyPr/>
@@ -8054,12 +8017,12 @@
                         </a:spcAft>
                       </a:pPr>
                       <a:r>
-                        <a:rPr lang="lt-LT" sz="1800">
+                        <a:rPr lang="lt-LT" sz="1800" dirty="0">
                           <a:effectLst/>
                         </a:rPr>
                         <a:t>Lotynų Amerikos ir Karibų regionas</a:t>
                       </a:r>
-                      <a:endParaRPr lang="lt-LT" sz="1800">
+                      <a:endParaRPr lang="lt-LT" sz="1800" dirty="0">
                         <a:effectLst/>
                         <a:latin typeface="Calibri" panose="020F0502020204030204" pitchFamily="34" charset="0"/>
                         <a:ea typeface="Calibri" panose="020F0502020204030204" pitchFamily="34" charset="0"/>
@@ -8324,7 +8287,115 @@
     </p:spTree>
     <p:extLst>
       <p:ext uri="{BB962C8B-B14F-4D97-AF65-F5344CB8AC3E}">
-        <p14:creationId xmlns:p14="http://schemas.microsoft.com/office/powerpoint/2010/main" val="383513931"/>
+        <p14:creationId xmlns:p14="http://schemas.microsoft.com/office/powerpoint/2010/main" val="4026163098"/>
+      </p:ext>
+    </p:extLst>
+  </p:cSld>
+  <p:clrMapOvr>
+    <a:masterClrMapping/>
+  </p:clrMapOvr>
+</p:sld>
+</file>
+
+<file path=ppt/slides/slide16.xml><?xml version="1.0" encoding="utf-8"?>
+<p:sld xmlns:a="http://schemas.openxmlformats.org/drawingml/2006/main" xmlns:r="http://schemas.openxmlformats.org/officeDocument/2006/relationships" xmlns:p="http://schemas.openxmlformats.org/presentationml/2006/main">
+  <p:cSld>
+    <p:spTree>
+      <p:nvGrpSpPr>
+        <p:cNvPr id="1" name=""/>
+        <p:cNvGrpSpPr/>
+        <p:nvPr/>
+      </p:nvGrpSpPr>
+      <p:grpSpPr>
+        <a:xfrm>
+          <a:off x="0" y="0"/>
+          <a:ext cx="0" cy="0"/>
+          <a:chOff x="0" y="0"/>
+          <a:chExt cx="0" cy="0"/>
+        </a:xfrm>
+      </p:grpSpPr>
+      <p:sp>
+        <p:nvSpPr>
+          <p:cNvPr id="2" name="Title 1">
+            <a:extLst>
+              <a:ext uri="{FF2B5EF4-FFF2-40B4-BE49-F238E27FC236}">
+                <a16:creationId xmlns:a16="http://schemas.microsoft.com/office/drawing/2014/main" id="{4DA4ECA3-3918-41B8-9DB9-0FA8AF4E9FD1}"/>
+              </a:ext>
+            </a:extLst>
+          </p:cNvPr>
+          <p:cNvSpPr>
+            <a:spLocks noGrp="1"/>
+          </p:cNvSpPr>
+          <p:nvPr>
+            <p:ph type="title"/>
+          </p:nvPr>
+        </p:nvSpPr>
+        <p:spPr/>
+        <p:txBody>
+          <a:bodyPr/>
+          <a:lstStyle/>
+          <a:p>
+            <a:r>
+              <a:rPr lang="lt-LT" dirty="0"/>
+              <a:t>Ekosistemos reitingai</a:t>
+            </a:r>
+            <a:endParaRPr lang="en-US" dirty="0"/>
+          </a:p>
+        </p:txBody>
+      </p:sp>
+      <p:sp>
+        <p:nvSpPr>
+          <p:cNvPr id="3" name="Content Placeholder 2">
+            <a:extLst>
+              <a:ext uri="{FF2B5EF4-FFF2-40B4-BE49-F238E27FC236}">
+                <a16:creationId xmlns:a16="http://schemas.microsoft.com/office/drawing/2014/main" id="{EDBB9B17-6809-4A82-BD98-652EB7DD029E}"/>
+              </a:ext>
+            </a:extLst>
+          </p:cNvPr>
+          <p:cNvSpPr>
+            <a:spLocks noGrp="1"/>
+          </p:cNvSpPr>
+          <p:nvPr>
+            <p:ph idx="1"/>
+          </p:nvPr>
+        </p:nvSpPr>
+        <p:spPr/>
+        <p:txBody>
+          <a:bodyPr>
+            <a:normAutofit/>
+          </a:bodyPr>
+          <a:lstStyle/>
+          <a:p>
+            <a:r>
+              <a:rPr lang="lt-LT" sz="2000" dirty="0"/>
+              <a:t>Pirma pasaulyje pagal paukščių rūšių kiekį</a:t>
+            </a:r>
+          </a:p>
+          <a:p>
+            <a:r>
+              <a:rPr lang="lt-LT" sz="2000" dirty="0"/>
+              <a:t>Antra pasaulyje pagal augalų rūšių kiekį</a:t>
+            </a:r>
+          </a:p>
+          <a:p>
+            <a:r>
+              <a:rPr lang="lt-LT" sz="2000" dirty="0"/>
+              <a:t>Trečia pasaulyje pagal roplių rūšių kiekį</a:t>
+            </a:r>
+          </a:p>
+          <a:p>
+            <a:r>
+              <a:rPr lang="lt-LT" sz="2000" dirty="0"/>
+              <a:t>Ketvirta pasaulyje pagal žinduolių rūšių kiekį</a:t>
+            </a:r>
+            <a:endParaRPr lang="en-US" sz="2000" dirty="0"/>
+          </a:p>
+        </p:txBody>
+      </p:sp>
+    </p:spTree>
+    <p:extLst>
+      <p:ext uri="{BB962C8B-B14F-4D97-AF65-F5344CB8AC3E}">
+        <p14:creationId xmlns:p14="http://schemas.microsoft.com/office/powerpoint/2010/main" val="307668021"/>
       </p:ext>
     </p:extLst>
   </p:cSld>
@@ -8356,7 +8427,7 @@
           <p:cNvPr id="2" name="Title 1">
             <a:extLst>
               <a:ext uri="{FF2B5EF4-FFF2-40B4-BE49-F238E27FC236}">
-                <a16:creationId xmlns:a16="http://schemas.microsoft.com/office/drawing/2014/main" id="{F5A613DF-EEF4-4884-B9D2-7FEFCE5A57DA}"/>
+                <a16:creationId xmlns:a16="http://schemas.microsoft.com/office/drawing/2014/main" id="{3E6D4229-D741-4C8F-B1BC-C883BE771C81}"/>
               </a:ext>
             </a:extLst>
           </p:cNvPr>
@@ -8374,17 +8445,18 @@
           <a:p>
             <a:r>
               <a:rPr lang="lt-LT" dirty="0"/>
-              <a:t>Išvados</a:t>
-            </a:r>
-          </a:p>
-        </p:txBody>
-      </p:sp>
-      <p:sp>
-        <p:nvSpPr>
-          <p:cNvPr id="10" name="Text Placeholder 9">
+              <a:t>Ekologinės problemos</a:t>
+            </a:r>
+            <a:endParaRPr lang="en-US" dirty="0"/>
+          </a:p>
+        </p:txBody>
+      </p:sp>
+      <p:sp>
+        <p:nvSpPr>
+          <p:cNvPr id="3" name="Content Placeholder 2">
             <a:extLst>
               <a:ext uri="{FF2B5EF4-FFF2-40B4-BE49-F238E27FC236}">
-                <a16:creationId xmlns:a16="http://schemas.microsoft.com/office/drawing/2014/main" id="{79CD9FB6-9CBC-411D-B897-DF7BE6093DFE}"/>
+                <a16:creationId xmlns:a16="http://schemas.microsoft.com/office/drawing/2014/main" id="{D7B8D801-4F0D-4D33-A26D-39093E21DD78}"/>
               </a:ext>
             </a:extLst>
           </p:cNvPr>
@@ -8397,59 +8469,491 @@
         </p:nvSpPr>
         <p:spPr/>
         <p:txBody>
-          <a:bodyPr/>
+          <a:bodyPr>
+            <a:normAutofit/>
+          </a:bodyPr>
           <a:lstStyle/>
           <a:p>
-            <a:pPr marL="285750" indent="-285750">
-              <a:buFont typeface="Arial" panose="020B0604020202020204" pitchFamily="34" charset="0"/>
-              <a:buChar char="•"/>
-            </a:pPr>
-            <a:r>
-              <a:rPr lang="lt-LT" sz="2400" dirty="0"/>
-              <a:t>Lyginant su didžiosiomis Pietų Amerikos šalimis, Kolumbijos ekonominė padėtis yra viena prasčiausių.</a:t>
-            </a:r>
-          </a:p>
-          <a:p>
-            <a:pPr marL="285750" indent="-285750">
-              <a:buFont typeface="Arial" panose="020B0604020202020204" pitchFamily="34" charset="0"/>
-              <a:buChar char="•"/>
-            </a:pPr>
-            <a:r>
-              <a:rPr lang="lt-LT" sz="2400" dirty="0"/>
-              <a:t>Populiacija didėja ir sensta, daugėja darbingo amžiaus žmonių.</a:t>
-            </a:r>
-          </a:p>
-          <a:p>
-            <a:pPr marL="285750" indent="-285750">
-              <a:buFont typeface="Arial" panose="020B0604020202020204" pitchFamily="34" charset="0"/>
-              <a:buChar char="•"/>
-            </a:pPr>
-            <a:r>
-              <a:rPr lang="lt-LT" sz="2400"/>
-              <a:t>Švietimo rodikliai nežymiai prastesni nei aukšto išsivystymo šalių ir Lotynų Amerikos ir Karibų regiono.</a:t>
-            </a:r>
-            <a:endParaRPr lang="lt-LT" sz="2400" dirty="0"/>
-          </a:p>
-          <a:p>
-            <a:pPr marL="285750" indent="-285750">
-              <a:buFont typeface="Arial" panose="020B0604020202020204" pitchFamily="34" charset="0"/>
-              <a:buChar char="•"/>
-            </a:pPr>
-            <a:endParaRPr lang="lt-LT" dirty="0"/>
-          </a:p>
-          <a:p>
-            <a:pPr marL="285750" indent="-285750">
-              <a:buFont typeface="Arial" panose="020B0604020202020204" pitchFamily="34" charset="0"/>
-              <a:buChar char="•"/>
-            </a:pPr>
-            <a:endParaRPr lang="lt-LT" dirty="0"/>
+            <a:r>
+              <a:rPr lang="lt-LT" sz="2800" dirty="0"/>
+              <a:t>Miškų naikinimas</a:t>
+            </a:r>
+          </a:p>
+          <a:p>
+            <a:r>
+              <a:rPr lang="lt-LT" sz="2800" dirty="0"/>
+              <a:t>Biologinės įvairovės mažėjimas</a:t>
+            </a:r>
+          </a:p>
+          <a:p>
+            <a:r>
+              <a:rPr lang="lt-LT" sz="2800" dirty="0"/>
+              <a:t>Oro tarša</a:t>
+            </a:r>
+          </a:p>
+          <a:p>
+            <a:r>
+              <a:rPr lang="lt-LT" sz="2800" dirty="0"/>
+              <a:t>Vandens tarša</a:t>
+            </a:r>
           </a:p>
         </p:txBody>
       </p:sp>
     </p:spTree>
     <p:extLst>
       <p:ext uri="{BB962C8B-B14F-4D97-AF65-F5344CB8AC3E}">
-        <p14:creationId xmlns:p14="http://schemas.microsoft.com/office/powerpoint/2010/main" val="2726633325"/>
+        <p14:creationId xmlns:p14="http://schemas.microsoft.com/office/powerpoint/2010/main" val="248359808"/>
+      </p:ext>
+    </p:extLst>
+  </p:cSld>
+  <p:clrMapOvr>
+    <a:masterClrMapping/>
+  </p:clrMapOvr>
+</p:sld>
+</file>
+
+<file path=ppt/slides/slide18.xml><?xml version="1.0" encoding="utf-8"?>
+<p:sld xmlns:a="http://schemas.openxmlformats.org/drawingml/2006/main" xmlns:r="http://schemas.openxmlformats.org/officeDocument/2006/relationships" xmlns:p="http://schemas.openxmlformats.org/presentationml/2006/main">
+  <p:cSld>
+    <p:spTree>
+      <p:nvGrpSpPr>
+        <p:cNvPr id="1" name=""/>
+        <p:cNvGrpSpPr/>
+        <p:nvPr/>
+      </p:nvGrpSpPr>
+      <p:grpSpPr>
+        <a:xfrm>
+          <a:off x="0" y="0"/>
+          <a:ext cx="0" cy="0"/>
+          <a:chOff x="0" y="0"/>
+          <a:chExt cx="0" cy="0"/>
+        </a:xfrm>
+      </p:grpSpPr>
+      <p:sp>
+        <p:nvSpPr>
+          <p:cNvPr id="2" name="Title 1">
+            <a:extLst>
+              <a:ext uri="{FF2B5EF4-FFF2-40B4-BE49-F238E27FC236}">
+                <a16:creationId xmlns:a16="http://schemas.microsoft.com/office/drawing/2014/main" id="{A042A3CC-58CA-43B7-B500-DBF8C0733FB6}"/>
+              </a:ext>
+            </a:extLst>
+          </p:cNvPr>
+          <p:cNvSpPr>
+            <a:spLocks noGrp="1"/>
+          </p:cNvSpPr>
+          <p:nvPr>
+            <p:ph type="title"/>
+          </p:nvPr>
+        </p:nvSpPr>
+        <p:spPr/>
+        <p:txBody>
+          <a:bodyPr/>
+          <a:lstStyle/>
+          <a:p>
+            <a:r>
+              <a:rPr lang="lt-LT" dirty="0"/>
+              <a:t>CO2 emisija gyventojui (2013)</a:t>
+            </a:r>
+            <a:endParaRPr lang="en-US" dirty="0"/>
+          </a:p>
+        </p:txBody>
+      </p:sp>
+      <p:graphicFrame>
+        <p:nvGraphicFramePr>
+          <p:cNvPr id="4" name="Content Placeholder 3">
+            <a:extLst>
+              <a:ext uri="{FF2B5EF4-FFF2-40B4-BE49-F238E27FC236}">
+                <a16:creationId xmlns:a16="http://schemas.microsoft.com/office/drawing/2014/main" id="{8685BBD5-02BF-4CA4-84E8-9BFB432FFBD7}"/>
+              </a:ext>
+            </a:extLst>
+          </p:cNvPr>
+          <p:cNvGraphicFramePr>
+            <a:graphicFrameLocks noGrp="1"/>
+          </p:cNvGraphicFramePr>
+          <p:nvPr>
+            <p:ph idx="1"/>
+          </p:nvPr>
+        </p:nvGraphicFramePr>
+        <p:xfrm>
+          <a:off x="677863" y="2160588"/>
+          <a:ext cx="8596311" cy="2123440"/>
+        </p:xfrm>
+        <a:graphic>
+          <a:graphicData uri="http://schemas.openxmlformats.org/drawingml/2006/table">
+            <a:tbl>
+              <a:tblPr firstRow="1" bandRow="1">
+                <a:tableStyleId>{5C22544A-7EE6-4342-B048-85BDC9FD1C3A}</a:tableStyleId>
+              </a:tblPr>
+              <a:tblGrid>
+                <a:gridCol w="2865437">
+                  <a:extLst>
+                    <a:ext uri="{9D8B030D-6E8A-4147-A177-3AD203B41FA5}">
+                      <a16:colId xmlns:a16="http://schemas.microsoft.com/office/drawing/2014/main" val="2864082371"/>
+                    </a:ext>
+                  </a:extLst>
+                </a:gridCol>
+                <a:gridCol w="2865437">
+                  <a:extLst>
+                    <a:ext uri="{9D8B030D-6E8A-4147-A177-3AD203B41FA5}">
+                      <a16:colId xmlns:a16="http://schemas.microsoft.com/office/drawing/2014/main" val="2442245422"/>
+                    </a:ext>
+                  </a:extLst>
+                </a:gridCol>
+                <a:gridCol w="2865437">
+                  <a:extLst>
+                    <a:ext uri="{9D8B030D-6E8A-4147-A177-3AD203B41FA5}">
+                      <a16:colId xmlns:a16="http://schemas.microsoft.com/office/drawing/2014/main" val="3465772992"/>
+                    </a:ext>
+                  </a:extLst>
+                </a:gridCol>
+              </a:tblGrid>
+              <a:tr h="370840">
+                <a:tc>
+                  <a:txBody>
+                    <a:bodyPr/>
+                    <a:lstStyle/>
+                    <a:p>
+                      <a:r>
+                        <a:rPr lang="lt-LT" dirty="0"/>
+                        <a:t>Valstybė</a:t>
+                      </a:r>
+                      <a:endParaRPr lang="en-US" dirty="0"/>
+                    </a:p>
+                  </a:txBody>
+                  <a:tcPr/>
+                </a:tc>
+                <a:tc>
+                  <a:txBody>
+                    <a:bodyPr/>
+                    <a:lstStyle/>
+                    <a:p>
+                      <a:r>
+                        <a:rPr lang="lt-LT" dirty="0"/>
+                        <a:t>CO2 emisija gyventojui tonomis</a:t>
+                      </a:r>
+                      <a:endParaRPr lang="en-US" dirty="0"/>
+                    </a:p>
+                  </a:txBody>
+                  <a:tcPr/>
+                </a:tc>
+                <a:tc>
+                  <a:txBody>
+                    <a:bodyPr/>
+                    <a:lstStyle/>
+                    <a:p>
+                      <a:r>
+                        <a:rPr lang="lt-LT" dirty="0"/>
+                        <a:t>HDI reitingas</a:t>
+                      </a:r>
+                      <a:endParaRPr lang="en-US" dirty="0"/>
+                    </a:p>
+                  </a:txBody>
+                  <a:tcPr/>
+                </a:tc>
+                <a:extLst>
+                  <a:ext uri="{0D108BD9-81ED-4DB2-BD59-A6C34878D82A}">
+                    <a16:rowId xmlns:a16="http://schemas.microsoft.com/office/drawing/2014/main" val="3865900408"/>
+                  </a:ext>
+                </a:extLst>
+              </a:tr>
+              <a:tr h="370840">
+                <a:tc>
+                  <a:txBody>
+                    <a:bodyPr/>
+                    <a:lstStyle/>
+                    <a:p>
+                      <a:r>
+                        <a:rPr lang="lt-LT" dirty="0"/>
+                        <a:t>Kolumbija</a:t>
+                      </a:r>
+                      <a:endParaRPr lang="en-US" dirty="0"/>
+                    </a:p>
+                  </a:txBody>
+                  <a:tcPr/>
+                </a:tc>
+                <a:tc>
+                  <a:txBody>
+                    <a:bodyPr/>
+                    <a:lstStyle/>
+                    <a:p>
+                      <a:r>
+                        <a:rPr lang="lt-LT" dirty="0"/>
+                        <a:t>1.9</a:t>
+                      </a:r>
+                      <a:endParaRPr lang="en-US" dirty="0"/>
+                    </a:p>
+                  </a:txBody>
+                  <a:tcPr/>
+                </a:tc>
+                <a:tc>
+                  <a:txBody>
+                    <a:bodyPr/>
+                    <a:lstStyle/>
+                    <a:p>
+                      <a:r>
+                        <a:rPr lang="lt-LT" dirty="0"/>
+                        <a:t>95</a:t>
+                      </a:r>
+                      <a:endParaRPr lang="en-US" dirty="0"/>
+                    </a:p>
+                  </a:txBody>
+                  <a:tcPr/>
+                </a:tc>
+                <a:extLst>
+                  <a:ext uri="{0D108BD9-81ED-4DB2-BD59-A6C34878D82A}">
+                    <a16:rowId xmlns:a16="http://schemas.microsoft.com/office/drawing/2014/main" val="3755259235"/>
+                  </a:ext>
+                </a:extLst>
+              </a:tr>
+              <a:tr h="370840">
+                <a:tc>
+                  <a:txBody>
+                    <a:bodyPr/>
+                    <a:lstStyle/>
+                    <a:p>
+                      <a:r>
+                        <a:rPr lang="lt-LT" dirty="0"/>
+                        <a:t>Argentina</a:t>
+                      </a:r>
+                      <a:endParaRPr lang="en-US" dirty="0"/>
+                    </a:p>
+                  </a:txBody>
+                  <a:tcPr/>
+                </a:tc>
+                <a:tc>
+                  <a:txBody>
+                    <a:bodyPr/>
+                    <a:lstStyle/>
+                    <a:p>
+                      <a:r>
+                        <a:rPr lang="lt-LT" dirty="0"/>
+                        <a:t>4.5</a:t>
+                      </a:r>
+                      <a:endParaRPr lang="en-US" dirty="0"/>
+                    </a:p>
+                  </a:txBody>
+                  <a:tcPr/>
+                </a:tc>
+                <a:tc>
+                  <a:txBody>
+                    <a:bodyPr/>
+                    <a:lstStyle/>
+                    <a:p>
+                      <a:r>
+                        <a:rPr lang="lt-LT" dirty="0"/>
+                        <a:t>45</a:t>
+                      </a:r>
+                      <a:endParaRPr lang="en-US" dirty="0"/>
+                    </a:p>
+                  </a:txBody>
+                  <a:tcPr/>
+                </a:tc>
+                <a:extLst>
+                  <a:ext uri="{0D108BD9-81ED-4DB2-BD59-A6C34878D82A}">
+                    <a16:rowId xmlns:a16="http://schemas.microsoft.com/office/drawing/2014/main" val="2354203778"/>
+                  </a:ext>
+                </a:extLst>
+              </a:tr>
+              <a:tr h="370840">
+                <a:tc>
+                  <a:txBody>
+                    <a:bodyPr/>
+                    <a:lstStyle/>
+                    <a:p>
+                      <a:r>
+                        <a:rPr lang="lt-LT" dirty="0"/>
+                        <a:t>Brazilija</a:t>
+                      </a:r>
+                      <a:endParaRPr lang="en-US" dirty="0"/>
+                    </a:p>
+                  </a:txBody>
+                  <a:tcPr/>
+                </a:tc>
+                <a:tc>
+                  <a:txBody>
+                    <a:bodyPr/>
+                    <a:lstStyle/>
+                    <a:p>
+                      <a:r>
+                        <a:rPr lang="lt-LT" dirty="0"/>
+                        <a:t>2.5</a:t>
+                      </a:r>
+                      <a:endParaRPr lang="en-US" dirty="0"/>
+                    </a:p>
+                  </a:txBody>
+                  <a:tcPr/>
+                </a:tc>
+                <a:tc>
+                  <a:txBody>
+                    <a:bodyPr/>
+                    <a:lstStyle/>
+                    <a:p>
+                      <a:r>
+                        <a:rPr lang="lt-LT" dirty="0"/>
+                        <a:t>79</a:t>
+                      </a:r>
+                      <a:endParaRPr lang="en-US" dirty="0"/>
+                    </a:p>
+                  </a:txBody>
+                  <a:tcPr/>
+                </a:tc>
+                <a:extLst>
+                  <a:ext uri="{0D108BD9-81ED-4DB2-BD59-A6C34878D82A}">
+                    <a16:rowId xmlns:a16="http://schemas.microsoft.com/office/drawing/2014/main" val="4183699288"/>
+                  </a:ext>
+                </a:extLst>
+              </a:tr>
+              <a:tr h="370840">
+                <a:tc>
+                  <a:txBody>
+                    <a:bodyPr/>
+                    <a:lstStyle/>
+                    <a:p>
+                      <a:r>
+                        <a:rPr lang="lt-LT" dirty="0"/>
+                        <a:t>Peru</a:t>
+                      </a:r>
+                      <a:endParaRPr lang="en-US" dirty="0"/>
+                    </a:p>
+                  </a:txBody>
+                  <a:tcPr/>
+                </a:tc>
+                <a:tc>
+                  <a:txBody>
+                    <a:bodyPr/>
+                    <a:lstStyle/>
+                    <a:p>
+                      <a:r>
+                        <a:rPr lang="lt-LT" dirty="0"/>
+                        <a:t>1.9</a:t>
+                      </a:r>
+                      <a:endParaRPr lang="en-US" dirty="0"/>
+                    </a:p>
+                  </a:txBody>
+                  <a:tcPr/>
+                </a:tc>
+                <a:tc>
+                  <a:txBody>
+                    <a:bodyPr/>
+                    <a:lstStyle/>
+                    <a:p>
+                      <a:r>
+                        <a:rPr lang="lt-LT" dirty="0"/>
+                        <a:t>87</a:t>
+                      </a:r>
+                      <a:endParaRPr lang="en-US" dirty="0"/>
+                    </a:p>
+                  </a:txBody>
+                  <a:tcPr/>
+                </a:tc>
+                <a:extLst>
+                  <a:ext uri="{0D108BD9-81ED-4DB2-BD59-A6C34878D82A}">
+                    <a16:rowId xmlns:a16="http://schemas.microsoft.com/office/drawing/2014/main" val="4141076601"/>
+                  </a:ext>
+                </a:extLst>
+              </a:tr>
+            </a:tbl>
+          </a:graphicData>
+        </a:graphic>
+      </p:graphicFrame>
+    </p:spTree>
+    <p:extLst>
+      <p:ext uri="{BB962C8B-B14F-4D97-AF65-F5344CB8AC3E}">
+        <p14:creationId xmlns:p14="http://schemas.microsoft.com/office/powerpoint/2010/main" val="3843531313"/>
+      </p:ext>
+    </p:extLst>
+  </p:cSld>
+  <p:clrMapOvr>
+    <a:masterClrMapping/>
+  </p:clrMapOvr>
+</p:sld>
+</file>
+
+<file path=ppt/slides/slide19.xml><?xml version="1.0" encoding="utf-8"?>
+<p:sld xmlns:a="http://schemas.openxmlformats.org/drawingml/2006/main" xmlns:r="http://schemas.openxmlformats.org/officeDocument/2006/relationships" xmlns:p="http://schemas.openxmlformats.org/presentationml/2006/main">
+  <p:cSld>
+    <p:spTree>
+      <p:nvGrpSpPr>
+        <p:cNvPr id="1" name=""/>
+        <p:cNvGrpSpPr/>
+        <p:nvPr/>
+      </p:nvGrpSpPr>
+      <p:grpSpPr>
+        <a:xfrm>
+          <a:off x="0" y="0"/>
+          <a:ext cx="0" cy="0"/>
+          <a:chOff x="0" y="0"/>
+          <a:chExt cx="0" cy="0"/>
+        </a:xfrm>
+      </p:grpSpPr>
+      <p:sp>
+        <p:nvSpPr>
+          <p:cNvPr id="2" name="Title 1">
+            <a:extLst>
+              <a:ext uri="{FF2B5EF4-FFF2-40B4-BE49-F238E27FC236}">
+                <a16:creationId xmlns:a16="http://schemas.microsoft.com/office/drawing/2014/main" id="{8F27951E-0911-403B-9668-F814A56B9698}"/>
+              </a:ext>
+            </a:extLst>
+          </p:cNvPr>
+          <p:cNvSpPr>
+            <a:spLocks noGrp="1"/>
+          </p:cNvSpPr>
+          <p:nvPr>
+            <p:ph type="title"/>
+          </p:nvPr>
+        </p:nvSpPr>
+        <p:spPr>
+          <a:xfrm>
+            <a:off x="673941" y="503583"/>
+            <a:ext cx="8596668" cy="1320800"/>
+          </a:xfrm>
+        </p:spPr>
+        <p:txBody>
+          <a:bodyPr/>
+          <a:lstStyle/>
+          <a:p>
+            <a:r>
+              <a:rPr lang="lt-LT" dirty="0"/>
+              <a:t>Kolumbijos ekologinis pėdsakas</a:t>
+            </a:r>
+            <a:endParaRPr lang="en-US" dirty="0"/>
+          </a:p>
+        </p:txBody>
+      </p:sp>
+      <p:pic>
+        <p:nvPicPr>
+          <p:cNvPr id="4" name="Picture 3">
+            <a:extLst>
+              <a:ext uri="{FF2B5EF4-FFF2-40B4-BE49-F238E27FC236}">
+                <a16:creationId xmlns:a16="http://schemas.microsoft.com/office/drawing/2014/main" id="{B5BD1070-D282-40F6-95A3-C206E236FD0A}"/>
+              </a:ext>
+            </a:extLst>
+          </p:cNvPr>
+          <p:cNvPicPr>
+            <a:picLocks noChangeAspect="1"/>
+          </p:cNvPicPr>
+          <p:nvPr/>
+        </p:nvPicPr>
+        <p:blipFill>
+          <a:blip r:embed="rId2"/>
+          <a:stretch>
+            <a:fillRect/>
+          </a:stretch>
+        </p:blipFill>
+        <p:spPr>
+          <a:xfrm>
+            <a:off x="1643270" y="1163983"/>
+            <a:ext cx="6658010" cy="4122640"/>
+          </a:xfrm>
+          <a:prstGeom prst="rect">
+            <a:avLst/>
+          </a:prstGeom>
+        </p:spPr>
+      </p:pic>
+    </p:spTree>
+    <p:extLst>
+      <p:ext uri="{BB962C8B-B14F-4D97-AF65-F5344CB8AC3E}">
+        <p14:creationId xmlns:p14="http://schemas.microsoft.com/office/powerpoint/2010/main" val="1171292862"/>
       </p:ext>
     </p:extLst>
   </p:cSld>
@@ -8547,6 +9051,12 @@
           <a:p>
             <a:r>
               <a:rPr lang="lt-LT" sz="2400" dirty="0"/>
+              <a:t>Kolumbijos švietimas</a:t>
+            </a:r>
+          </a:p>
+          <a:p>
+            <a:r>
+              <a:rPr lang="lt-LT" sz="2400" dirty="0"/>
               <a:t>Kolumbijos ekologija</a:t>
             </a:r>
           </a:p>
@@ -8559,13 +9069,7 @@
           <a:p>
             <a:r>
               <a:rPr lang="lt-LT" sz="2400" dirty="0"/>
-              <a:t>Kolumbijos politika</a:t>
-            </a:r>
-          </a:p>
-          <a:p>
-            <a:r>
-              <a:rPr lang="lt-LT" sz="2400" dirty="0"/>
-              <a:t>Kolumbijos švietimas</a:t>
+              <a:t>Kolumbijos sveikatos gerovė</a:t>
             </a:r>
           </a:p>
           <a:p>
@@ -8580,6 +9084,704 @@
     <p:extLst>
       <p:ext uri="{BB962C8B-B14F-4D97-AF65-F5344CB8AC3E}">
         <p14:creationId xmlns:p14="http://schemas.microsoft.com/office/powerpoint/2010/main" val="1426520263"/>
+      </p:ext>
+    </p:extLst>
+  </p:cSld>
+  <p:clrMapOvr>
+    <a:masterClrMapping/>
+  </p:clrMapOvr>
+</p:sld>
+</file>
+
+<file path=ppt/slides/slide20.xml><?xml version="1.0" encoding="utf-8"?>
+<p:sld xmlns:a="http://schemas.openxmlformats.org/drawingml/2006/main" xmlns:r="http://schemas.openxmlformats.org/officeDocument/2006/relationships" xmlns:p="http://schemas.openxmlformats.org/presentationml/2006/main">
+  <p:cSld>
+    <p:spTree>
+      <p:nvGrpSpPr>
+        <p:cNvPr id="1" name=""/>
+        <p:cNvGrpSpPr/>
+        <p:nvPr/>
+      </p:nvGrpSpPr>
+      <p:grpSpPr>
+        <a:xfrm>
+          <a:off x="0" y="0"/>
+          <a:ext cx="0" cy="0"/>
+          <a:chOff x="0" y="0"/>
+          <a:chExt cx="0" cy="0"/>
+        </a:xfrm>
+      </p:grpSpPr>
+      <p:sp>
+        <p:nvSpPr>
+          <p:cNvPr id="2" name="Title 1">
+            <a:extLst>
+              <a:ext uri="{FF2B5EF4-FFF2-40B4-BE49-F238E27FC236}">
+                <a16:creationId xmlns:a16="http://schemas.microsoft.com/office/drawing/2014/main" id="{8F27951E-0911-403B-9668-F814A56B9698}"/>
+              </a:ext>
+            </a:extLst>
+          </p:cNvPr>
+          <p:cNvSpPr>
+            <a:spLocks noGrp="1"/>
+          </p:cNvSpPr>
+          <p:nvPr>
+            <p:ph type="title"/>
+          </p:nvPr>
+        </p:nvSpPr>
+        <p:spPr>
+          <a:xfrm>
+            <a:off x="673941" y="503583"/>
+            <a:ext cx="8596668" cy="1320800"/>
+          </a:xfrm>
+        </p:spPr>
+        <p:txBody>
+          <a:bodyPr/>
+          <a:lstStyle/>
+          <a:p>
+            <a:r>
+              <a:rPr lang="lt-LT" dirty="0"/>
+              <a:t>Kolumbijos socialinės raidos indeksas</a:t>
+            </a:r>
+            <a:endParaRPr lang="en-US" dirty="0"/>
+          </a:p>
+        </p:txBody>
+      </p:sp>
+      <p:sp>
+        <p:nvSpPr>
+          <p:cNvPr id="5" name="TextBox 4">
+            <a:extLst>
+              <a:ext uri="{FF2B5EF4-FFF2-40B4-BE49-F238E27FC236}">
+                <a16:creationId xmlns:a16="http://schemas.microsoft.com/office/drawing/2014/main" id="{F8F7C6FC-CDDF-4454-A6E9-2154194ED289}"/>
+              </a:ext>
+            </a:extLst>
+          </p:cNvPr>
+          <p:cNvSpPr txBox="1"/>
+          <p:nvPr/>
+        </p:nvSpPr>
+        <p:spPr>
+          <a:xfrm>
+            <a:off x="1166191" y="1391478"/>
+            <a:ext cx="7917927" cy="369332"/>
+          </a:xfrm>
+          <a:prstGeom prst="rect">
+            <a:avLst/>
+          </a:prstGeom>
+          <a:noFill/>
+        </p:spPr>
+        <p:txBody>
+          <a:bodyPr wrap="square" rtlCol="0">
+            <a:spAutoFit/>
+          </a:bodyPr>
+          <a:lstStyle/>
+          <a:p>
+            <a:r>
+              <a:rPr lang="lt-LT" dirty="0"/>
+              <a:t>Kolumbijos socialinės raidos indeksas – 0.727.</a:t>
+            </a:r>
+            <a:endParaRPr lang="en-US" dirty="0"/>
+          </a:p>
+        </p:txBody>
+      </p:sp>
+      <p:pic>
+        <p:nvPicPr>
+          <p:cNvPr id="4" name="Picture 3">
+            <a:extLst>
+              <a:ext uri="{FF2B5EF4-FFF2-40B4-BE49-F238E27FC236}">
+                <a16:creationId xmlns:a16="http://schemas.microsoft.com/office/drawing/2014/main" id="{506018C7-82F6-4177-BE05-167B9E64D108}"/>
+              </a:ext>
+            </a:extLst>
+          </p:cNvPr>
+          <p:cNvPicPr>
+            <a:picLocks noChangeAspect="1"/>
+          </p:cNvPicPr>
+          <p:nvPr/>
+        </p:nvPicPr>
+        <p:blipFill>
+          <a:blip r:embed="rId2"/>
+          <a:stretch>
+            <a:fillRect/>
+          </a:stretch>
+        </p:blipFill>
+        <p:spPr>
+          <a:xfrm>
+            <a:off x="546847" y="2037809"/>
+            <a:ext cx="9163459" cy="4080603"/>
+          </a:xfrm>
+          <a:prstGeom prst="rect">
+            <a:avLst/>
+          </a:prstGeom>
+        </p:spPr>
+      </p:pic>
+    </p:spTree>
+    <p:extLst>
+      <p:ext uri="{BB962C8B-B14F-4D97-AF65-F5344CB8AC3E}">
+        <p14:creationId xmlns:p14="http://schemas.microsoft.com/office/powerpoint/2010/main" val="3095680623"/>
+      </p:ext>
+    </p:extLst>
+  </p:cSld>
+  <p:clrMapOvr>
+    <a:masterClrMapping/>
+  </p:clrMapOvr>
+</p:sld>
+</file>
+
+<file path=ppt/slides/slide21.xml><?xml version="1.0" encoding="utf-8"?>
+<p:sld xmlns:a="http://schemas.openxmlformats.org/drawingml/2006/main" xmlns:r="http://schemas.openxmlformats.org/officeDocument/2006/relationships" xmlns:p="http://schemas.openxmlformats.org/presentationml/2006/main">
+  <p:cSld>
+    <p:spTree>
+      <p:nvGrpSpPr>
+        <p:cNvPr id="1" name=""/>
+        <p:cNvGrpSpPr/>
+        <p:nvPr/>
+      </p:nvGrpSpPr>
+      <p:grpSpPr>
+        <a:xfrm>
+          <a:off x="0" y="0"/>
+          <a:ext cx="0" cy="0"/>
+          <a:chOff x="0" y="0"/>
+          <a:chExt cx="0" cy="0"/>
+        </a:xfrm>
+      </p:grpSpPr>
+      <p:sp>
+        <p:nvSpPr>
+          <p:cNvPr id="2" name="Title 1">
+            <a:extLst>
+              <a:ext uri="{FF2B5EF4-FFF2-40B4-BE49-F238E27FC236}">
+                <a16:creationId xmlns:a16="http://schemas.microsoft.com/office/drawing/2014/main" id="{485E94A0-8CFB-4BB2-92F1-8C204C1D7725}"/>
+              </a:ext>
+            </a:extLst>
+          </p:cNvPr>
+          <p:cNvSpPr>
+            <a:spLocks noGrp="1"/>
+          </p:cNvSpPr>
+          <p:nvPr>
+            <p:ph type="title"/>
+          </p:nvPr>
+        </p:nvSpPr>
+        <p:spPr/>
+        <p:txBody>
+          <a:bodyPr/>
+          <a:lstStyle/>
+          <a:p>
+            <a:r>
+              <a:rPr lang="lt-LT" dirty="0"/>
+              <a:t>Lyčių nelygybė</a:t>
+            </a:r>
+            <a:endParaRPr lang="en-US" dirty="0"/>
+          </a:p>
+        </p:txBody>
+      </p:sp>
+      <p:sp>
+        <p:nvSpPr>
+          <p:cNvPr id="3" name="Content Placeholder 2">
+            <a:extLst>
+              <a:ext uri="{FF2B5EF4-FFF2-40B4-BE49-F238E27FC236}">
+                <a16:creationId xmlns:a16="http://schemas.microsoft.com/office/drawing/2014/main" id="{37AA7DEE-BC55-4ECF-A171-90C047C010C2}"/>
+              </a:ext>
+            </a:extLst>
+          </p:cNvPr>
+          <p:cNvSpPr>
+            <a:spLocks noGrp="1"/>
+          </p:cNvSpPr>
+          <p:nvPr>
+            <p:ph idx="1"/>
+          </p:nvPr>
+        </p:nvSpPr>
+        <p:spPr>
+          <a:xfrm>
+            <a:off x="677334" y="1488613"/>
+            <a:ext cx="8596668" cy="3880773"/>
+          </a:xfrm>
+        </p:spPr>
+        <p:txBody>
+          <a:bodyPr/>
+          <a:lstStyle/>
+          <a:p>
+            <a:pPr algn="just"/>
+            <a:r>
+              <a:rPr lang="lt-LT" dirty="0"/>
+              <a:t>Kolumbijos lyčių nelygybės indeksas – 0.393</a:t>
+            </a:r>
+          </a:p>
+          <a:p>
+            <a:pPr algn="just"/>
+            <a:r>
+              <a:rPr lang="lt-LT" dirty="0"/>
+              <a:t>Visame Pietų Amerikos žemyne lyčių nelygybės indeksas yra panšus</a:t>
+            </a:r>
+          </a:p>
+          <a:p>
+            <a:pPr algn="just"/>
+            <a:r>
+              <a:rPr lang="lt-LT" dirty="0"/>
+              <a:t>Vos 20% Kolumbijos parlamento sudaro moterys</a:t>
+            </a:r>
+            <a:endParaRPr lang="en-US" dirty="0"/>
+          </a:p>
+        </p:txBody>
+      </p:sp>
+      <p:pic>
+        <p:nvPicPr>
+          <p:cNvPr id="5" name="Picture 4">
+            <a:extLst>
+              <a:ext uri="{FF2B5EF4-FFF2-40B4-BE49-F238E27FC236}">
+                <a16:creationId xmlns:a16="http://schemas.microsoft.com/office/drawing/2014/main" id="{0FE6AEC9-BCC1-4836-829F-CB7FA7D905B8}"/>
+              </a:ext>
+            </a:extLst>
+          </p:cNvPr>
+          <p:cNvPicPr>
+            <a:picLocks noChangeAspect="1"/>
+          </p:cNvPicPr>
+          <p:nvPr/>
+        </p:nvPicPr>
+        <p:blipFill>
+          <a:blip r:embed="rId2"/>
+          <a:stretch>
+            <a:fillRect/>
+          </a:stretch>
+        </p:blipFill>
+        <p:spPr>
+          <a:xfrm>
+            <a:off x="1284450" y="2809413"/>
+            <a:ext cx="7382435" cy="3244234"/>
+          </a:xfrm>
+          <a:prstGeom prst="rect">
+            <a:avLst/>
+          </a:prstGeom>
+        </p:spPr>
+      </p:pic>
+    </p:spTree>
+    <p:extLst>
+      <p:ext uri="{BB962C8B-B14F-4D97-AF65-F5344CB8AC3E}">
+        <p14:creationId xmlns:p14="http://schemas.microsoft.com/office/powerpoint/2010/main" val="2669731313"/>
+      </p:ext>
+    </p:extLst>
+  </p:cSld>
+  <p:clrMapOvr>
+    <a:masterClrMapping/>
+  </p:clrMapOvr>
+</p:sld>
+</file>
+
+<file path=ppt/slides/slide22.xml><?xml version="1.0" encoding="utf-8"?>
+<p:sld xmlns:a="http://schemas.openxmlformats.org/drawingml/2006/main" xmlns:r="http://schemas.openxmlformats.org/officeDocument/2006/relationships" xmlns:p="http://schemas.openxmlformats.org/presentationml/2006/main">
+  <p:cSld>
+    <p:spTree>
+      <p:nvGrpSpPr>
+        <p:cNvPr id="1" name=""/>
+        <p:cNvGrpSpPr/>
+        <p:nvPr/>
+      </p:nvGrpSpPr>
+      <p:grpSpPr>
+        <a:xfrm>
+          <a:off x="0" y="0"/>
+          <a:ext cx="0" cy="0"/>
+          <a:chOff x="0" y="0"/>
+          <a:chExt cx="0" cy="0"/>
+        </a:xfrm>
+      </p:grpSpPr>
+      <p:sp>
+        <p:nvSpPr>
+          <p:cNvPr id="2" name="Title 1">
+            <a:extLst>
+              <a:ext uri="{FF2B5EF4-FFF2-40B4-BE49-F238E27FC236}">
+                <a16:creationId xmlns:a16="http://schemas.microsoft.com/office/drawing/2014/main" id="{A6C77164-A3A8-45E9-8953-314B8649F2CF}"/>
+              </a:ext>
+            </a:extLst>
+          </p:cNvPr>
+          <p:cNvSpPr>
+            <a:spLocks noGrp="1"/>
+          </p:cNvSpPr>
+          <p:nvPr>
+            <p:ph type="title"/>
+          </p:nvPr>
+        </p:nvSpPr>
+        <p:spPr/>
+        <p:txBody>
+          <a:bodyPr/>
+          <a:lstStyle/>
+          <a:p>
+            <a:r>
+              <a:rPr lang="lt-LT" dirty="0"/>
+              <a:t>Tikėtina gyvenimo trukmė Kolumbijoje</a:t>
+            </a:r>
+            <a:endParaRPr lang="en-US" dirty="0"/>
+          </a:p>
+        </p:txBody>
+      </p:sp>
+      <p:pic>
+        <p:nvPicPr>
+          <p:cNvPr id="4" name="Picture 3">
+            <a:extLst>
+              <a:ext uri="{FF2B5EF4-FFF2-40B4-BE49-F238E27FC236}">
+                <a16:creationId xmlns:a16="http://schemas.microsoft.com/office/drawing/2014/main" id="{95A03075-75CB-4A02-9B6B-C6A52D454DF6}"/>
+              </a:ext>
+            </a:extLst>
+          </p:cNvPr>
+          <p:cNvPicPr>
+            <a:picLocks noChangeAspect="1"/>
+          </p:cNvPicPr>
+          <p:nvPr/>
+        </p:nvPicPr>
+        <p:blipFill>
+          <a:blip r:embed="rId2"/>
+          <a:stretch>
+            <a:fillRect/>
+          </a:stretch>
+        </p:blipFill>
+        <p:spPr>
+          <a:xfrm>
+            <a:off x="838699" y="1510630"/>
+            <a:ext cx="8596669" cy="3836740"/>
+          </a:xfrm>
+          <a:prstGeom prst="rect">
+            <a:avLst/>
+          </a:prstGeom>
+        </p:spPr>
+      </p:pic>
+    </p:spTree>
+    <p:extLst>
+      <p:ext uri="{BB962C8B-B14F-4D97-AF65-F5344CB8AC3E}">
+        <p14:creationId xmlns:p14="http://schemas.microsoft.com/office/powerpoint/2010/main" val="2919317223"/>
+      </p:ext>
+    </p:extLst>
+  </p:cSld>
+  <p:clrMapOvr>
+    <a:masterClrMapping/>
+  </p:clrMapOvr>
+</p:sld>
+</file>
+
+<file path=ppt/slides/slide23.xml><?xml version="1.0" encoding="utf-8"?>
+<p:sld xmlns:a="http://schemas.openxmlformats.org/drawingml/2006/main" xmlns:r="http://schemas.openxmlformats.org/officeDocument/2006/relationships" xmlns:p="http://schemas.openxmlformats.org/presentationml/2006/main">
+  <p:cSld>
+    <p:spTree>
+      <p:nvGrpSpPr>
+        <p:cNvPr id="1" name=""/>
+        <p:cNvGrpSpPr/>
+        <p:nvPr/>
+      </p:nvGrpSpPr>
+      <p:grpSpPr>
+        <a:xfrm>
+          <a:off x="0" y="0"/>
+          <a:ext cx="0" cy="0"/>
+          <a:chOff x="0" y="0"/>
+          <a:chExt cx="0" cy="0"/>
+        </a:xfrm>
+      </p:grpSpPr>
+      <p:sp>
+        <p:nvSpPr>
+          <p:cNvPr id="2" name="Title 1">
+            <a:extLst>
+              <a:ext uri="{FF2B5EF4-FFF2-40B4-BE49-F238E27FC236}">
+                <a16:creationId xmlns:a16="http://schemas.microsoft.com/office/drawing/2014/main" id="{1DC2C6F9-1E18-422C-8EB6-9B272F7C0747}"/>
+              </a:ext>
+            </a:extLst>
+          </p:cNvPr>
+          <p:cNvSpPr>
+            <a:spLocks noGrp="1"/>
+          </p:cNvSpPr>
+          <p:nvPr>
+            <p:ph type="title"/>
+          </p:nvPr>
+        </p:nvSpPr>
+        <p:spPr/>
+        <p:txBody>
+          <a:bodyPr/>
+          <a:lstStyle/>
+          <a:p>
+            <a:r>
+              <a:rPr lang="lt-LT" dirty="0"/>
+              <a:t>Mirtingumas iki penkerių metų (iš 1000 gimusių)</a:t>
+            </a:r>
+            <a:endParaRPr lang="en-US" dirty="0"/>
+          </a:p>
+        </p:txBody>
+      </p:sp>
+      <p:pic>
+        <p:nvPicPr>
+          <p:cNvPr id="4" name="Picture 3">
+            <a:extLst>
+              <a:ext uri="{FF2B5EF4-FFF2-40B4-BE49-F238E27FC236}">
+                <a16:creationId xmlns:a16="http://schemas.microsoft.com/office/drawing/2014/main" id="{5732193A-9FC3-404E-B192-FE86B9DE9207}"/>
+              </a:ext>
+            </a:extLst>
+          </p:cNvPr>
+          <p:cNvPicPr>
+            <a:picLocks noChangeAspect="1"/>
+          </p:cNvPicPr>
+          <p:nvPr/>
+        </p:nvPicPr>
+        <p:blipFill>
+          <a:blip r:embed="rId2"/>
+          <a:stretch>
+            <a:fillRect/>
+          </a:stretch>
+        </p:blipFill>
+        <p:spPr>
+          <a:xfrm>
+            <a:off x="239246" y="1786497"/>
+            <a:ext cx="9696450" cy="3876675"/>
+          </a:xfrm>
+          <a:prstGeom prst="rect">
+            <a:avLst/>
+          </a:prstGeom>
+        </p:spPr>
+      </p:pic>
+    </p:spTree>
+    <p:extLst>
+      <p:ext uri="{BB962C8B-B14F-4D97-AF65-F5344CB8AC3E}">
+        <p14:creationId xmlns:p14="http://schemas.microsoft.com/office/powerpoint/2010/main" val="201900239"/>
+      </p:ext>
+    </p:extLst>
+  </p:cSld>
+  <p:clrMapOvr>
+    <a:masterClrMapping/>
+  </p:clrMapOvr>
+</p:sld>
+</file>
+
+<file path=ppt/slides/slide24.xml><?xml version="1.0" encoding="utf-8"?>
+<p:sld xmlns:a="http://schemas.openxmlformats.org/drawingml/2006/main" xmlns:r="http://schemas.openxmlformats.org/officeDocument/2006/relationships" xmlns:p="http://schemas.openxmlformats.org/presentationml/2006/main">
+  <p:cSld>
+    <p:spTree>
+      <p:nvGrpSpPr>
+        <p:cNvPr id="1" name=""/>
+        <p:cNvGrpSpPr/>
+        <p:nvPr/>
+      </p:nvGrpSpPr>
+      <p:grpSpPr>
+        <a:xfrm>
+          <a:off x="0" y="0"/>
+          <a:ext cx="0" cy="0"/>
+          <a:chOff x="0" y="0"/>
+          <a:chExt cx="0" cy="0"/>
+        </a:xfrm>
+      </p:grpSpPr>
+      <p:sp>
+        <p:nvSpPr>
+          <p:cNvPr id="2" name="Title 1">
+            <a:extLst>
+              <a:ext uri="{FF2B5EF4-FFF2-40B4-BE49-F238E27FC236}">
+                <a16:creationId xmlns:a16="http://schemas.microsoft.com/office/drawing/2014/main" id="{F5A613DF-EEF4-4884-B9D2-7FEFCE5A57DA}"/>
+              </a:ext>
+            </a:extLst>
+          </p:cNvPr>
+          <p:cNvSpPr>
+            <a:spLocks noGrp="1"/>
+          </p:cNvSpPr>
+          <p:nvPr>
+            <p:ph type="title"/>
+          </p:nvPr>
+        </p:nvSpPr>
+        <p:spPr/>
+        <p:txBody>
+          <a:bodyPr/>
+          <a:lstStyle/>
+          <a:p>
+            <a:r>
+              <a:rPr lang="lt-LT" dirty="0"/>
+              <a:t>Išvados</a:t>
+            </a:r>
+          </a:p>
+        </p:txBody>
+      </p:sp>
+      <p:sp>
+        <p:nvSpPr>
+          <p:cNvPr id="10" name="Text Placeholder 9">
+            <a:extLst>
+              <a:ext uri="{FF2B5EF4-FFF2-40B4-BE49-F238E27FC236}">
+                <a16:creationId xmlns:a16="http://schemas.microsoft.com/office/drawing/2014/main" id="{79CD9FB6-9CBC-411D-B897-DF7BE6093DFE}"/>
+              </a:ext>
+            </a:extLst>
+          </p:cNvPr>
+          <p:cNvSpPr>
+            <a:spLocks noGrp="1"/>
+          </p:cNvSpPr>
+          <p:nvPr>
+            <p:ph idx="1"/>
+          </p:nvPr>
+        </p:nvSpPr>
+        <p:spPr>
+          <a:xfrm>
+            <a:off x="677334" y="1622707"/>
+            <a:ext cx="8596668" cy="3880773"/>
+          </a:xfrm>
+        </p:spPr>
+        <p:txBody>
+          <a:bodyPr>
+            <a:normAutofit/>
+          </a:bodyPr>
+          <a:lstStyle/>
+          <a:p>
+            <a:pPr marL="285750" indent="-285750" algn="just">
+              <a:buFont typeface="Arial" panose="020B0604020202020204" pitchFamily="34" charset="0"/>
+              <a:buChar char="•"/>
+            </a:pPr>
+            <a:r>
+              <a:rPr lang="lt-LT" sz="2400" dirty="0"/>
+              <a:t>Lyginant su didžiosiomis Pietų Amerikos šalimis, Kolumbijos ekonominė padėtis yra viena prasčiausių.</a:t>
+            </a:r>
+          </a:p>
+          <a:p>
+            <a:pPr marL="285750" indent="-285750" algn="just">
+              <a:buFont typeface="Arial" panose="020B0604020202020204" pitchFamily="34" charset="0"/>
+              <a:buChar char="•"/>
+            </a:pPr>
+            <a:r>
+              <a:rPr lang="lt-LT" sz="2400" dirty="0"/>
+              <a:t>Populiacija didėja ir sensta, daugėja darbingo amžiaus žmonių.</a:t>
+            </a:r>
+          </a:p>
+          <a:p>
+            <a:pPr marL="285750" indent="-285750" algn="just">
+              <a:buFont typeface="Arial" panose="020B0604020202020204" pitchFamily="34" charset="0"/>
+              <a:buChar char="•"/>
+            </a:pPr>
+            <a:r>
+              <a:rPr lang="lt-LT" sz="2400" dirty="0"/>
+              <a:t>Švietimo rodikliai nežymiai prastesni nei aukšto išsivystymo šalių ir Lotynų Amerikos ir Karibų regiono.</a:t>
+            </a:r>
+            <a:endParaRPr lang="lt-LT" dirty="0"/>
+          </a:p>
+          <a:p>
+            <a:pPr marL="285750" indent="-285750" algn="just">
+              <a:buFont typeface="Arial" panose="020B0604020202020204" pitchFamily="34" charset="0"/>
+              <a:buChar char="•"/>
+            </a:pPr>
+            <a:endParaRPr lang="lt-LT" dirty="0"/>
+          </a:p>
+        </p:txBody>
+      </p:sp>
+    </p:spTree>
+    <p:extLst>
+      <p:ext uri="{BB962C8B-B14F-4D97-AF65-F5344CB8AC3E}">
+        <p14:creationId xmlns:p14="http://schemas.microsoft.com/office/powerpoint/2010/main" val="2726633325"/>
+      </p:ext>
+    </p:extLst>
+  </p:cSld>
+  <p:clrMapOvr>
+    <a:masterClrMapping/>
+  </p:clrMapOvr>
+</p:sld>
+</file>
+
+<file path=ppt/slides/slide25.xml><?xml version="1.0" encoding="utf-8"?>
+<p:sld xmlns:a="http://schemas.openxmlformats.org/drawingml/2006/main" xmlns:r="http://schemas.openxmlformats.org/officeDocument/2006/relationships" xmlns:p="http://schemas.openxmlformats.org/presentationml/2006/main">
+  <p:cSld>
+    <p:spTree>
+      <p:nvGrpSpPr>
+        <p:cNvPr id="1" name=""/>
+        <p:cNvGrpSpPr/>
+        <p:nvPr/>
+      </p:nvGrpSpPr>
+      <p:grpSpPr>
+        <a:xfrm>
+          <a:off x="0" y="0"/>
+          <a:ext cx="0" cy="0"/>
+          <a:chOff x="0" y="0"/>
+          <a:chExt cx="0" cy="0"/>
+        </a:xfrm>
+      </p:grpSpPr>
+      <p:sp>
+        <p:nvSpPr>
+          <p:cNvPr id="2" name="Title 1">
+            <a:extLst>
+              <a:ext uri="{FF2B5EF4-FFF2-40B4-BE49-F238E27FC236}">
+                <a16:creationId xmlns:a16="http://schemas.microsoft.com/office/drawing/2014/main" id="{12203DCC-BC5D-4D2B-AC59-444A28726E3E}"/>
+              </a:ext>
+            </a:extLst>
+          </p:cNvPr>
+          <p:cNvSpPr>
+            <a:spLocks noGrp="1"/>
+          </p:cNvSpPr>
+          <p:nvPr>
+            <p:ph type="title"/>
+          </p:nvPr>
+        </p:nvSpPr>
+        <p:spPr/>
+        <p:txBody>
+          <a:bodyPr/>
+          <a:lstStyle/>
+          <a:p>
+            <a:r>
+              <a:rPr lang="lt-LT" dirty="0"/>
+              <a:t>Išvados (2)</a:t>
+            </a:r>
+            <a:endParaRPr lang="en-US" dirty="0"/>
+          </a:p>
+        </p:txBody>
+      </p:sp>
+      <p:sp>
+        <p:nvSpPr>
+          <p:cNvPr id="3" name="Content Placeholder 2">
+            <a:extLst>
+              <a:ext uri="{FF2B5EF4-FFF2-40B4-BE49-F238E27FC236}">
+                <a16:creationId xmlns:a16="http://schemas.microsoft.com/office/drawing/2014/main" id="{07E13056-AA81-4939-9103-C2CB4516B703}"/>
+              </a:ext>
+            </a:extLst>
+          </p:cNvPr>
+          <p:cNvSpPr>
+            <a:spLocks noGrp="1"/>
+          </p:cNvSpPr>
+          <p:nvPr>
+            <p:ph idx="1"/>
+          </p:nvPr>
+        </p:nvSpPr>
+        <p:spPr/>
+        <p:txBody>
+          <a:bodyPr>
+            <a:normAutofit/>
+          </a:bodyPr>
+          <a:lstStyle/>
+          <a:p>
+            <a:pPr marL="285750" indent="-285750" algn="just">
+              <a:buFont typeface="Arial" panose="020B0604020202020204" pitchFamily="34" charset="0"/>
+              <a:buChar char="•"/>
+            </a:pPr>
+            <a:r>
+              <a:rPr lang="lt-LT" sz="2000" dirty="0"/>
+              <a:t>Kolumbija pasižymi maža CO2 emisija tiek Lotynų Amerikos ir Karibų regione, tiek visame pasaulyje.</a:t>
+            </a:r>
+          </a:p>
+          <a:p>
+            <a:pPr marL="285750" indent="-285750" algn="just">
+              <a:buFont typeface="Arial" panose="020B0604020202020204" pitchFamily="34" charset="0"/>
+              <a:buChar char="•"/>
+            </a:pPr>
+            <a:r>
+              <a:rPr lang="lt-LT" sz="2000" dirty="0"/>
+              <a:t>Kolumbija yra turtinga savo ekosistemos įvairove.</a:t>
+            </a:r>
+          </a:p>
+          <a:p>
+            <a:pPr marL="285750" indent="-285750" algn="just">
+              <a:buFont typeface="Arial" panose="020B0604020202020204" pitchFamily="34" charset="0"/>
+              <a:buChar char="•"/>
+            </a:pPr>
+            <a:r>
+              <a:rPr lang="lt-LT" sz="2000" dirty="0"/>
+              <a:t>Nepaisant sveikatos apsaugos reformų, Kolumbijos sveikatos apsauga yra viena prasčiausių tarp aukšto išsivystimo šalių Pietų Amerikoje.</a:t>
+            </a:r>
+          </a:p>
+          <a:p>
+            <a:pPr marL="285750" indent="-285750" algn="just">
+              <a:buFont typeface="Arial" panose="020B0604020202020204" pitchFamily="34" charset="0"/>
+              <a:buChar char="•"/>
+            </a:pPr>
+            <a:r>
+              <a:rPr lang="lt-LT" sz="2000" dirty="0"/>
+              <a:t>Kolumbijos socialinės raidos indeksas nors ir lėtai, tačiau kyla.</a:t>
+            </a:r>
+          </a:p>
+          <a:p>
+            <a:pPr algn="just"/>
+            <a:endParaRPr lang="en-US" sz="2000" dirty="0"/>
+          </a:p>
+        </p:txBody>
+      </p:sp>
+    </p:spTree>
+    <p:extLst>
+      <p:ext uri="{BB962C8B-B14F-4D97-AF65-F5344CB8AC3E}">
+        <p14:creationId xmlns:p14="http://schemas.microsoft.com/office/powerpoint/2010/main" val="2494728454"/>
       </p:ext>
     </p:extLst>
   </p:cSld>
@@ -8606,34 +9808,6 @@
           <a:chExt cx="0" cy="0"/>
         </a:xfrm>
       </p:grpSpPr>
-      <p:sp>
-        <p:nvSpPr>
-          <p:cNvPr id="2" name="Title 1">
-            <a:extLst>
-              <a:ext uri="{FF2B5EF4-FFF2-40B4-BE49-F238E27FC236}">
-                <a16:creationId xmlns:a16="http://schemas.microsoft.com/office/drawing/2014/main" id="{192339E7-6F7E-4BE2-8970-4DA3444813D3}"/>
-              </a:ext>
-            </a:extLst>
-          </p:cNvPr>
-          <p:cNvSpPr>
-            <a:spLocks noGrp="1"/>
-          </p:cNvSpPr>
-          <p:nvPr>
-            <p:ph type="title"/>
-          </p:nvPr>
-        </p:nvSpPr>
-        <p:spPr/>
-        <p:txBody>
-          <a:bodyPr/>
-          <a:lstStyle/>
-          <a:p>
-            <a:r>
-              <a:rPr lang="lt-LT" dirty="0"/>
-              <a:t>Tikslai</a:t>
-            </a:r>
-          </a:p>
-        </p:txBody>
-      </p:sp>
       <p:pic>
         <p:nvPicPr>
           <p:cNvPr id="7" name="Content Placeholder 6">
@@ -8671,6 +9845,34 @@
       </p:pic>
       <p:sp>
         <p:nvSpPr>
+          <p:cNvPr id="2" name="Title 1">
+            <a:extLst>
+              <a:ext uri="{FF2B5EF4-FFF2-40B4-BE49-F238E27FC236}">
+                <a16:creationId xmlns:a16="http://schemas.microsoft.com/office/drawing/2014/main" id="{192339E7-6F7E-4BE2-8970-4DA3444813D3}"/>
+              </a:ext>
+            </a:extLst>
+          </p:cNvPr>
+          <p:cNvSpPr>
+            <a:spLocks noGrp="1"/>
+          </p:cNvSpPr>
+          <p:nvPr>
+            <p:ph type="title"/>
+          </p:nvPr>
+        </p:nvSpPr>
+        <p:spPr/>
+        <p:txBody>
+          <a:bodyPr/>
+          <a:lstStyle/>
+          <a:p>
+            <a:r>
+              <a:rPr lang="lt-LT" dirty="0"/>
+              <a:t>Tikslai</a:t>
+            </a:r>
+          </a:p>
+        </p:txBody>
+      </p:sp>
+      <p:sp>
+        <p:nvSpPr>
           <p:cNvPr id="5" name="Content Placeholder 4">
             <a:extLst>
               <a:ext uri="{FF2B5EF4-FFF2-40B4-BE49-F238E27FC236}">
@@ -8723,7 +9925,7 @@
             </a:pPr>
             <a:r>
               <a:rPr lang="lt-LT" sz="2400" dirty="0"/>
-              <a:t>Įvertinti žmonių sveikatos Kolumbijoje rodiklius</a:t>
+              <a:t>Įvertinti Kolumbijos švietimo rodiklius</a:t>
             </a:r>
           </a:p>
           <a:p>
@@ -8733,7 +9935,7 @@
             </a:pPr>
             <a:r>
               <a:rPr lang="lt-LT" sz="2400" dirty="0"/>
-              <a:t>Apžvelgti Kolumbijos politiką</a:t>
+              <a:t>Įvertinti žmonių sveikatos Kolumbijoje rodiklius</a:t>
             </a:r>
           </a:p>
           <a:p>
@@ -8743,7 +9945,7 @@
             </a:pPr>
             <a:r>
               <a:rPr lang="lt-LT" sz="2400" dirty="0"/>
-              <a:t>Nustatyti ir įvertinti šalies ekologinį lygį</a:t>
+              <a:t>Įvertinti šalies ekologinį lygį</a:t>
             </a:r>
           </a:p>
           <a:p>
@@ -9431,7 +10633,7 @@
 <file path=ppt/theme/theme1.xml><?xml version="1.0" encoding="utf-8"?>
 <a:theme xmlns:a="http://schemas.openxmlformats.org/drawingml/2006/main" name="Facet">
   <a:themeElements>
-    <a:clrScheme name="Facet">
+    <a:clrScheme name="Aspect">
       <a:dk1>
         <a:sysClr val="windowText" lastClr="000000"/>
       </a:dk1>
@@ -9439,34 +10641,34 @@
         <a:sysClr val="window" lastClr="FFFFFF"/>
       </a:lt1>
       <a:dk2>
-        <a:srgbClr val="2C3C43"/>
+        <a:srgbClr val="323232"/>
       </a:dk2>
       <a:lt2>
-        <a:srgbClr val="EBEBEB"/>
+        <a:srgbClr val="E3DED1"/>
       </a:lt2>
       <a:accent1>
-        <a:srgbClr val="90C226"/>
+        <a:srgbClr val="F07F09"/>
       </a:accent1>
       <a:accent2>
-        <a:srgbClr val="54A021"/>
+        <a:srgbClr val="9F2936"/>
       </a:accent2>
       <a:accent3>
-        <a:srgbClr val="E6B91E"/>
+        <a:srgbClr val="1B587C"/>
       </a:accent3>
       <a:accent4>
-        <a:srgbClr val="E76618"/>
+        <a:srgbClr val="4E8542"/>
       </a:accent4>
       <a:accent5>
-        <a:srgbClr val="C42F1A"/>
+        <a:srgbClr val="604878"/>
       </a:accent5>
       <a:accent6>
-        <a:srgbClr val="918655"/>
+        <a:srgbClr val="C19859"/>
       </a:accent6>
       <a:hlink>
-        <a:srgbClr val="99CA3C"/>
+        <a:srgbClr val="6B9F25"/>
       </a:hlink>
       <a:folHlink>
-        <a:srgbClr val="B9D181"/>
+        <a:srgbClr val="B26B02"/>
       </a:folHlink>
     </a:clrScheme>
     <a:fontScheme name="Facet">

</xml_diff>